<commit_message>
first attempt at poster
</commit_message>
<xml_diff>
--- a/poster/Poster.pptx
+++ b/poster/Poster.pptx
@@ -4,9 +4,14 @@
   <p:sldMasterIdLst>
     <p:sldMasterId id="2147483672" r:id="rId1"/>
   </p:sldMasterIdLst>
+  <p:notesMasterIdLst>
+    <p:notesMasterId r:id="rId6"/>
+  </p:notesMasterIdLst>
   <p:sldIdLst>
-    <p:sldId id="256" r:id="rId2"/>
-    <p:sldId id="257" r:id="rId3"/>
+    <p:sldId id="258" r:id="rId2"/>
+    <p:sldId id="259" r:id="rId3"/>
+    <p:sldId id="256" r:id="rId4"/>
+    <p:sldId id="257" r:id="rId5"/>
   </p:sldIdLst>
   <p:sldSz cx="43891200" cy="32918400"/>
   <p:notesSz cx="6858000" cy="9144000"/>
@@ -105,7 +110,361 @@
       </a:defRPr>
     </a:lvl9pPr>
   </p:defaultTextStyle>
+  <p:extLst>
+    <p:ext uri="{EFAFB233-063F-42B5-8137-9DF3F51BA10A}">
+      <p15:sldGuideLst xmlns:p15="http://schemas.microsoft.com/office/powerpoint/2012/main"/>
+    </p:ext>
+  </p:extLst>
 </p:presentation>
+</file>
+
+<file path=ppt/notesMasters/notesMaster1.xml><?xml version="1.0" encoding="utf-8"?>
+<p:notesMaster xmlns:a="http://schemas.openxmlformats.org/drawingml/2006/main" xmlns:r="http://schemas.openxmlformats.org/officeDocument/2006/relationships" xmlns:p="http://schemas.openxmlformats.org/presentationml/2006/main">
+  <p:cSld>
+    <p:bg>
+      <p:bgRef idx="1001">
+        <a:schemeClr val="bg1"/>
+      </p:bgRef>
+    </p:bg>
+    <p:spTree>
+      <p:nvGrpSpPr>
+        <p:cNvPr id="1" name=""/>
+        <p:cNvGrpSpPr/>
+        <p:nvPr/>
+      </p:nvGrpSpPr>
+      <p:grpSpPr>
+        <a:xfrm>
+          <a:off x="0" y="0"/>
+          <a:ext cx="0" cy="0"/>
+          <a:chOff x="0" y="0"/>
+          <a:chExt cx="0" cy="0"/>
+        </a:xfrm>
+      </p:grpSpPr>
+      <p:sp>
+        <p:nvSpPr>
+          <p:cNvPr id="2" name="Header Placeholder 1"/>
+          <p:cNvSpPr>
+            <a:spLocks noGrp="1"/>
+          </p:cNvSpPr>
+          <p:nvPr>
+            <p:ph type="hdr" sz="quarter"/>
+          </p:nvPr>
+        </p:nvSpPr>
+        <p:spPr>
+          <a:xfrm>
+            <a:off x="0" y="0"/>
+            <a:ext cx="2971800" cy="458788"/>
+          </a:xfrm>
+          <a:prstGeom prst="rect">
+            <a:avLst/>
+          </a:prstGeom>
+        </p:spPr>
+        <p:txBody>
+          <a:bodyPr vert="horz" lIns="91440" tIns="45720" rIns="91440" bIns="45720" rtlCol="0"/>
+          <a:lstStyle>
+            <a:lvl1pPr algn="l">
+              <a:defRPr sz="1200"/>
+            </a:lvl1pPr>
+          </a:lstStyle>
+          <a:p>
+            <a:endParaRPr lang="en-US"/>
+          </a:p>
+        </p:txBody>
+      </p:sp>
+      <p:sp>
+        <p:nvSpPr>
+          <p:cNvPr id="3" name="Date Placeholder 2"/>
+          <p:cNvSpPr>
+            <a:spLocks noGrp="1"/>
+          </p:cNvSpPr>
+          <p:nvPr>
+            <p:ph type="dt" idx="1"/>
+          </p:nvPr>
+        </p:nvSpPr>
+        <p:spPr>
+          <a:xfrm>
+            <a:off x="3884613" y="0"/>
+            <a:ext cx="2971800" cy="458788"/>
+          </a:xfrm>
+          <a:prstGeom prst="rect">
+            <a:avLst/>
+          </a:prstGeom>
+        </p:spPr>
+        <p:txBody>
+          <a:bodyPr vert="horz" lIns="91440" tIns="45720" rIns="91440" bIns="45720" rtlCol="0"/>
+          <a:lstStyle>
+            <a:lvl1pPr algn="r">
+              <a:defRPr sz="1200"/>
+            </a:lvl1pPr>
+          </a:lstStyle>
+          <a:p>
+            <a:fld id="{3D4F2AB0-DD4A-184B-9DCF-430CD49425A1}" type="datetimeFigureOut">
+              <a:rPr lang="en-US" smtClean="0"/>
+              <a:t>11/29/19</a:t>
+            </a:fld>
+            <a:endParaRPr lang="en-US"/>
+          </a:p>
+        </p:txBody>
+      </p:sp>
+      <p:sp>
+        <p:nvSpPr>
+          <p:cNvPr id="4" name="Slide Image Placeholder 3"/>
+          <p:cNvSpPr>
+            <a:spLocks noGrp="1" noRot="1" noChangeAspect="1"/>
+          </p:cNvSpPr>
+          <p:nvPr>
+            <p:ph type="sldImg" idx="2"/>
+          </p:nvPr>
+        </p:nvSpPr>
+        <p:spPr>
+          <a:xfrm>
+            <a:off x="1371600" y="1143000"/>
+            <a:ext cx="4114800" cy="3086100"/>
+          </a:xfrm>
+          <a:prstGeom prst="rect">
+            <a:avLst/>
+          </a:prstGeom>
+          <a:noFill/>
+          <a:ln w="12700">
+            <a:solidFill>
+              <a:prstClr val="black"/>
+            </a:solidFill>
+          </a:ln>
+        </p:spPr>
+        <p:txBody>
+          <a:bodyPr vert="horz" lIns="91440" tIns="45720" rIns="91440" bIns="45720" rtlCol="0" anchor="ctr"/>
+          <a:lstStyle/>
+          <a:p>
+            <a:endParaRPr lang="en-US"/>
+          </a:p>
+        </p:txBody>
+      </p:sp>
+      <p:sp>
+        <p:nvSpPr>
+          <p:cNvPr id="5" name="Notes Placeholder 4"/>
+          <p:cNvSpPr>
+            <a:spLocks noGrp="1"/>
+          </p:cNvSpPr>
+          <p:nvPr>
+            <p:ph type="body" sz="quarter" idx="3"/>
+          </p:nvPr>
+        </p:nvSpPr>
+        <p:spPr>
+          <a:xfrm>
+            <a:off x="685800" y="4400550"/>
+            <a:ext cx="5486400" cy="3600450"/>
+          </a:xfrm>
+          <a:prstGeom prst="rect">
+            <a:avLst/>
+          </a:prstGeom>
+        </p:spPr>
+        <p:txBody>
+          <a:bodyPr vert="horz" lIns="91440" tIns="45720" rIns="91440" bIns="45720" rtlCol="0"/>
+          <a:lstStyle/>
+          <a:p>
+            <a:pPr lvl="0"/>
+            <a:r>
+              <a:rPr lang="en-US"/>
+              <a:t>Click to edit Master text styles</a:t>
+            </a:r>
+          </a:p>
+          <a:p>
+            <a:pPr lvl="1"/>
+            <a:r>
+              <a:rPr lang="en-US"/>
+              <a:t>Second level</a:t>
+            </a:r>
+          </a:p>
+          <a:p>
+            <a:pPr lvl="2"/>
+            <a:r>
+              <a:rPr lang="en-US"/>
+              <a:t>Third level</a:t>
+            </a:r>
+          </a:p>
+          <a:p>
+            <a:pPr lvl="3"/>
+            <a:r>
+              <a:rPr lang="en-US"/>
+              <a:t>Fourth level</a:t>
+            </a:r>
+          </a:p>
+          <a:p>
+            <a:pPr lvl="4"/>
+            <a:r>
+              <a:rPr lang="en-US"/>
+              <a:t>Fifth level</a:t>
+            </a:r>
+          </a:p>
+        </p:txBody>
+      </p:sp>
+      <p:sp>
+        <p:nvSpPr>
+          <p:cNvPr id="6" name="Footer Placeholder 5"/>
+          <p:cNvSpPr>
+            <a:spLocks noGrp="1"/>
+          </p:cNvSpPr>
+          <p:nvPr>
+            <p:ph type="ftr" sz="quarter" idx="4"/>
+          </p:nvPr>
+        </p:nvSpPr>
+        <p:spPr>
+          <a:xfrm>
+            <a:off x="0" y="8685213"/>
+            <a:ext cx="2971800" cy="458787"/>
+          </a:xfrm>
+          <a:prstGeom prst="rect">
+            <a:avLst/>
+          </a:prstGeom>
+        </p:spPr>
+        <p:txBody>
+          <a:bodyPr vert="horz" lIns="91440" tIns="45720" rIns="91440" bIns="45720" rtlCol="0" anchor="b"/>
+          <a:lstStyle>
+            <a:lvl1pPr algn="l">
+              <a:defRPr sz="1200"/>
+            </a:lvl1pPr>
+          </a:lstStyle>
+          <a:p>
+            <a:endParaRPr lang="en-US"/>
+          </a:p>
+        </p:txBody>
+      </p:sp>
+      <p:sp>
+        <p:nvSpPr>
+          <p:cNvPr id="7" name="Slide Number Placeholder 6"/>
+          <p:cNvSpPr>
+            <a:spLocks noGrp="1"/>
+          </p:cNvSpPr>
+          <p:nvPr>
+            <p:ph type="sldNum" sz="quarter" idx="5"/>
+          </p:nvPr>
+        </p:nvSpPr>
+        <p:spPr>
+          <a:xfrm>
+            <a:off x="3884613" y="8685213"/>
+            <a:ext cx="2971800" cy="458787"/>
+          </a:xfrm>
+          <a:prstGeom prst="rect">
+            <a:avLst/>
+          </a:prstGeom>
+        </p:spPr>
+        <p:txBody>
+          <a:bodyPr vert="horz" lIns="91440" tIns="45720" rIns="91440" bIns="45720" rtlCol="0" anchor="b"/>
+          <a:lstStyle>
+            <a:lvl1pPr algn="r">
+              <a:defRPr sz="1200"/>
+            </a:lvl1pPr>
+          </a:lstStyle>
+          <a:p>
+            <a:fld id="{32B33914-D2E4-6C46-8976-4DCC511A5CED}" type="slidenum">
+              <a:rPr lang="en-US" smtClean="0"/>
+              <a:t>‹#›</a:t>
+            </a:fld>
+            <a:endParaRPr lang="en-US"/>
+          </a:p>
+        </p:txBody>
+      </p:sp>
+    </p:spTree>
+    <p:extLst>
+      <p:ext uri="{BB962C8B-B14F-4D97-AF65-F5344CB8AC3E}">
+        <p14:creationId xmlns:p14="http://schemas.microsoft.com/office/powerpoint/2010/main" val="14805849"/>
+      </p:ext>
+    </p:extLst>
+  </p:cSld>
+  <p:clrMap bg1="lt1" tx1="dk1" bg2="lt2" tx2="dk2" accent1="accent1" accent2="accent2" accent3="accent3" accent4="accent4" accent5="accent5" accent6="accent6" hlink="hlink" folHlink="folHlink"/>
+  <p:notesStyle>
+    <a:lvl1pPr marL="0" algn="l" defTabSz="914400" rtl="0" eaLnBrk="1" latinLnBrk="0" hangingPunct="1">
+      <a:defRPr sz="1200" kern="1200">
+        <a:solidFill>
+          <a:schemeClr val="tx1"/>
+        </a:solidFill>
+        <a:latin typeface="+mn-lt"/>
+        <a:ea typeface="+mn-ea"/>
+        <a:cs typeface="+mn-cs"/>
+      </a:defRPr>
+    </a:lvl1pPr>
+    <a:lvl2pPr marL="457200" algn="l" defTabSz="914400" rtl="0" eaLnBrk="1" latinLnBrk="0" hangingPunct="1">
+      <a:defRPr sz="1200" kern="1200">
+        <a:solidFill>
+          <a:schemeClr val="tx1"/>
+        </a:solidFill>
+        <a:latin typeface="+mn-lt"/>
+        <a:ea typeface="+mn-ea"/>
+        <a:cs typeface="+mn-cs"/>
+      </a:defRPr>
+    </a:lvl2pPr>
+    <a:lvl3pPr marL="914400" algn="l" defTabSz="914400" rtl="0" eaLnBrk="1" latinLnBrk="0" hangingPunct="1">
+      <a:defRPr sz="1200" kern="1200">
+        <a:solidFill>
+          <a:schemeClr val="tx1"/>
+        </a:solidFill>
+        <a:latin typeface="+mn-lt"/>
+        <a:ea typeface="+mn-ea"/>
+        <a:cs typeface="+mn-cs"/>
+      </a:defRPr>
+    </a:lvl3pPr>
+    <a:lvl4pPr marL="1371600" algn="l" defTabSz="914400" rtl="0" eaLnBrk="1" latinLnBrk="0" hangingPunct="1">
+      <a:defRPr sz="1200" kern="1200">
+        <a:solidFill>
+          <a:schemeClr val="tx1"/>
+        </a:solidFill>
+        <a:latin typeface="+mn-lt"/>
+        <a:ea typeface="+mn-ea"/>
+        <a:cs typeface="+mn-cs"/>
+      </a:defRPr>
+    </a:lvl4pPr>
+    <a:lvl5pPr marL="1828800" algn="l" defTabSz="914400" rtl="0" eaLnBrk="1" latinLnBrk="0" hangingPunct="1">
+      <a:defRPr sz="1200" kern="1200">
+        <a:solidFill>
+          <a:schemeClr val="tx1"/>
+        </a:solidFill>
+        <a:latin typeface="+mn-lt"/>
+        <a:ea typeface="+mn-ea"/>
+        <a:cs typeface="+mn-cs"/>
+      </a:defRPr>
+    </a:lvl5pPr>
+    <a:lvl6pPr marL="2286000" algn="l" defTabSz="914400" rtl="0" eaLnBrk="1" latinLnBrk="0" hangingPunct="1">
+      <a:defRPr sz="1200" kern="1200">
+        <a:solidFill>
+          <a:schemeClr val="tx1"/>
+        </a:solidFill>
+        <a:latin typeface="+mn-lt"/>
+        <a:ea typeface="+mn-ea"/>
+        <a:cs typeface="+mn-cs"/>
+      </a:defRPr>
+    </a:lvl6pPr>
+    <a:lvl7pPr marL="2743200" algn="l" defTabSz="914400" rtl="0" eaLnBrk="1" latinLnBrk="0" hangingPunct="1">
+      <a:defRPr sz="1200" kern="1200">
+        <a:solidFill>
+          <a:schemeClr val="tx1"/>
+        </a:solidFill>
+        <a:latin typeface="+mn-lt"/>
+        <a:ea typeface="+mn-ea"/>
+        <a:cs typeface="+mn-cs"/>
+      </a:defRPr>
+    </a:lvl7pPr>
+    <a:lvl8pPr marL="3200400" algn="l" defTabSz="914400" rtl="0" eaLnBrk="1" latinLnBrk="0" hangingPunct="1">
+      <a:defRPr sz="1200" kern="1200">
+        <a:solidFill>
+          <a:schemeClr val="tx1"/>
+        </a:solidFill>
+        <a:latin typeface="+mn-lt"/>
+        <a:ea typeface="+mn-ea"/>
+        <a:cs typeface="+mn-cs"/>
+      </a:defRPr>
+    </a:lvl8pPr>
+    <a:lvl9pPr marL="3657600" algn="l" defTabSz="914400" rtl="0" eaLnBrk="1" latinLnBrk="0" hangingPunct="1">
+      <a:defRPr sz="1200" kern="1200">
+        <a:solidFill>
+          <a:schemeClr val="tx1"/>
+        </a:solidFill>
+        <a:latin typeface="+mn-lt"/>
+        <a:ea typeface="+mn-ea"/>
+        <a:cs typeface="+mn-cs"/>
+      </a:defRPr>
+    </a:lvl9pPr>
+  </p:notesStyle>
+</p:notesMaster>
 </file>
 
 <file path=ppt/slideLayouts/slideLayout1.xml><?xml version="1.0" encoding="utf-8"?>
@@ -255,7 +614,7 @@
           <a:p>
             <a:fld id="{5C5B84BE-8907-4088-A091-8BB02B06D018}" type="datetimeFigureOut">
               <a:rPr lang="en-US" smtClean="0"/>
-              <a:t>11/29/2019</a:t>
+              <a:t>11/29/19</a:t>
             </a:fld>
             <a:endParaRPr lang="en-US"/>
           </a:p>
@@ -453,7 +812,7 @@
           <a:p>
             <a:fld id="{5C5B84BE-8907-4088-A091-8BB02B06D018}" type="datetimeFigureOut">
               <a:rPr lang="en-US" smtClean="0"/>
-              <a:t>11/29/2019</a:t>
+              <a:t>11/29/19</a:t>
             </a:fld>
             <a:endParaRPr lang="en-US"/>
           </a:p>
@@ -661,7 +1020,7 @@
           <a:p>
             <a:fld id="{5C5B84BE-8907-4088-A091-8BB02B06D018}" type="datetimeFigureOut">
               <a:rPr lang="en-US" smtClean="0"/>
-              <a:t>11/29/2019</a:t>
+              <a:t>11/29/19</a:t>
             </a:fld>
             <a:endParaRPr lang="en-US"/>
           </a:p>
@@ -859,7 +1218,7 @@
           <a:p>
             <a:fld id="{5C5B84BE-8907-4088-A091-8BB02B06D018}" type="datetimeFigureOut">
               <a:rPr lang="en-US" smtClean="0"/>
-              <a:t>11/29/2019</a:t>
+              <a:t>11/29/19</a:t>
             </a:fld>
             <a:endParaRPr lang="en-US"/>
           </a:p>
@@ -1134,7 +1493,7 @@
           <a:p>
             <a:fld id="{5C5B84BE-8907-4088-A091-8BB02B06D018}" type="datetimeFigureOut">
               <a:rPr lang="en-US" smtClean="0"/>
-              <a:t>11/29/2019</a:t>
+              <a:t>11/29/19</a:t>
             </a:fld>
             <a:endParaRPr lang="en-US"/>
           </a:p>
@@ -1399,7 +1758,7 @@
           <a:p>
             <a:fld id="{5C5B84BE-8907-4088-A091-8BB02B06D018}" type="datetimeFigureOut">
               <a:rPr lang="en-US" smtClean="0"/>
-              <a:t>11/29/2019</a:t>
+              <a:t>11/29/19</a:t>
             </a:fld>
             <a:endParaRPr lang="en-US"/>
           </a:p>
@@ -1811,7 +2170,7 @@
           <a:p>
             <a:fld id="{5C5B84BE-8907-4088-A091-8BB02B06D018}" type="datetimeFigureOut">
               <a:rPr lang="en-US" smtClean="0"/>
-              <a:t>11/29/2019</a:t>
+              <a:t>11/29/19</a:t>
             </a:fld>
             <a:endParaRPr lang="en-US"/>
           </a:p>
@@ -1952,7 +2311,7 @@
           <a:p>
             <a:fld id="{5C5B84BE-8907-4088-A091-8BB02B06D018}" type="datetimeFigureOut">
               <a:rPr lang="en-US" smtClean="0"/>
-              <a:t>11/29/2019</a:t>
+              <a:t>11/29/19</a:t>
             </a:fld>
             <a:endParaRPr lang="en-US"/>
           </a:p>
@@ -2065,7 +2424,7 @@
           <a:p>
             <a:fld id="{5C5B84BE-8907-4088-A091-8BB02B06D018}" type="datetimeFigureOut">
               <a:rPr lang="en-US" smtClean="0"/>
-              <a:t>11/29/2019</a:t>
+              <a:t>11/29/19</a:t>
             </a:fld>
             <a:endParaRPr lang="en-US"/>
           </a:p>
@@ -2376,7 +2735,7 @@
           <a:p>
             <a:fld id="{5C5B84BE-8907-4088-A091-8BB02B06D018}" type="datetimeFigureOut">
               <a:rPr lang="en-US" smtClean="0"/>
-              <a:t>11/29/2019</a:t>
+              <a:t>11/29/19</a:t>
             </a:fld>
             <a:endParaRPr lang="en-US"/>
           </a:p>
@@ -2664,7 +3023,7 @@
           <a:p>
             <a:fld id="{5C5B84BE-8907-4088-A091-8BB02B06D018}" type="datetimeFigureOut">
               <a:rPr lang="en-US" smtClean="0"/>
-              <a:t>11/29/2019</a:t>
+              <a:t>11/29/19</a:t>
             </a:fld>
             <a:endParaRPr lang="en-US"/>
           </a:p>
@@ -2905,7 +3264,7 @@
           <a:p>
             <a:fld id="{5C5B84BE-8907-4088-A091-8BB02B06D018}" type="datetimeFigureOut">
               <a:rPr lang="en-US" smtClean="0"/>
-              <a:t>11/29/2019</a:t>
+              <a:t>11/29/19</a:t>
             </a:fld>
             <a:endParaRPr lang="en-US"/>
           </a:p>
@@ -3324,6 +3683,1529 @@
       </p:grpSpPr>
       <p:sp>
         <p:nvSpPr>
+          <p:cNvPr id="4" name="Text Box 130">
+            <a:extLst>
+              <a:ext uri="{FF2B5EF4-FFF2-40B4-BE49-F238E27FC236}">
+                <a16:creationId xmlns:a16="http://schemas.microsoft.com/office/drawing/2014/main" id="{B8931247-BD65-5D41-99E0-43B21ED3DCF0}"/>
+              </a:ext>
+            </a:extLst>
+          </p:cNvPr>
+          <p:cNvSpPr txBox="1">
+            <a:spLocks noChangeArrowheads="1"/>
+          </p:cNvSpPr>
+          <p:nvPr/>
+        </p:nvSpPr>
+        <p:spPr bwMode="auto">
+          <a:xfrm>
+            <a:off x="4660362" y="495935"/>
+            <a:ext cx="34841085" cy="3393168"/>
+          </a:xfrm>
+          <a:prstGeom prst="rect">
+            <a:avLst/>
+          </a:prstGeom>
+          <a:noFill/>
+          <a:ln>
+            <a:noFill/>
+          </a:ln>
+          <a:effectLst/>
+          <a:extLst>
+            <a:ext uri="{909E8E84-426E-40DD-AFC4-6F175D3DCCD1}">
+              <a14:hiddenFill xmlns:a14="http://schemas.microsoft.com/office/drawing/2010/main">
+                <a:solidFill>
+                  <a:srgbClr val="FFFFFF"/>
+                </a:solidFill>
+              </a14:hiddenFill>
+            </a:ext>
+            <a:ext uri="{91240B29-F687-4F45-9708-019B960494DF}">
+              <a14:hiddenLine xmlns:a14="http://schemas.microsoft.com/office/drawing/2010/main" w="9525" algn="in">
+                <a:solidFill>
+                  <a:srgbClr val="000000"/>
+                </a:solidFill>
+                <a:miter lim="800000"/>
+                <a:headEnd/>
+                <a:tailEnd/>
+              </a14:hiddenLine>
+            </a:ext>
+            <a:ext uri="{AF507438-7753-43E0-B8FC-AC1667EBCBE1}">
+              <a14:hiddenEffects xmlns:a14="http://schemas.microsoft.com/office/drawing/2010/main">
+                <a:effectLst>
+                  <a:outerShdw dist="35921" dir="2700000" algn="ctr" rotWithShape="0">
+                    <a:srgbClr val="FFC000"/>
+                  </a:outerShdw>
+                </a:effectLst>
+              </a14:hiddenEffects>
+            </a:ext>
+          </a:extLst>
+        </p:spPr>
+        <p:txBody>
+          <a:bodyPr vert="horz" wrap="square" lIns="36576" tIns="36576" rIns="36576" bIns="36576" numCol="1" anchor="t" anchorCtr="0" compatLnSpc="1">
+            <a:prstTxWarp prst="textNoShape">
+              <a:avLst/>
+            </a:prstTxWarp>
+          </a:bodyPr>
+          <a:lstStyle/>
+          <a:p>
+            <a:pPr marL="0" marR="0" lvl="0" indent="0" algn="ctr" defTabSz="914400" rtl="0" eaLnBrk="0" fontAlgn="base" latinLnBrk="0" hangingPunct="0">
+              <a:lnSpc>
+                <a:spcPct val="100000"/>
+              </a:lnSpc>
+              <a:spcBef>
+                <a:spcPct val="0"/>
+              </a:spcBef>
+              <a:spcAft>
+                <a:spcPct val="0"/>
+              </a:spcAft>
+              <a:buClrTx/>
+              <a:buSzTx/>
+              <a:buFontTx/>
+              <a:buNone/>
+              <a:tabLst/>
+            </a:pPr>
+            <a:r>
+              <a:rPr kumimoji="0" lang="en-US" altLang="en-US" sz="11600" b="0" i="0" u="none" strike="noStrike" cap="none" normalizeH="0" baseline="0" dirty="0">
+                <a:ln>
+                  <a:noFill/>
+                </a:ln>
+                <a:solidFill>
+                  <a:srgbClr val="000000"/>
+                </a:solidFill>
+                <a:effectLst/>
+                <a:latin typeface="Cambria" panose="02040503050406030204" pitchFamily="18" charset="0"/>
+              </a:rPr>
+              <a:t>A Systematic Approach to Analyzing Syndication of Viral News Stories</a:t>
+            </a:r>
+            <a:endParaRPr kumimoji="0" lang="en-US" altLang="en-US" sz="2000" b="0" i="0" u="none" strike="noStrike" cap="none" normalizeH="0" baseline="0" dirty="0">
+              <a:ln>
+                <a:noFill/>
+              </a:ln>
+              <a:solidFill>
+                <a:schemeClr val="tx1"/>
+              </a:solidFill>
+              <a:effectLst/>
+              <a:latin typeface="Arial" panose="020B0604020202020204" pitchFamily="34" charset="0"/>
+            </a:endParaRPr>
+          </a:p>
+        </p:txBody>
+      </p:sp>
+      <p:sp>
+        <p:nvSpPr>
+          <p:cNvPr id="5" name="Text Box 129">
+            <a:extLst>
+              <a:ext uri="{FF2B5EF4-FFF2-40B4-BE49-F238E27FC236}">
+                <a16:creationId xmlns:a16="http://schemas.microsoft.com/office/drawing/2014/main" id="{17AC0FB7-46E4-A144-BFC0-75B662479DC8}"/>
+              </a:ext>
+            </a:extLst>
+          </p:cNvPr>
+          <p:cNvSpPr txBox="1">
+            <a:spLocks noChangeArrowheads="1"/>
+          </p:cNvSpPr>
+          <p:nvPr/>
+        </p:nvSpPr>
+        <p:spPr bwMode="auto">
+          <a:xfrm>
+            <a:off x="457200" y="3960393"/>
+            <a:ext cx="42976800" cy="2282305"/>
+          </a:xfrm>
+          <a:prstGeom prst="rect">
+            <a:avLst/>
+          </a:prstGeom>
+          <a:noFill/>
+          <a:ln>
+            <a:noFill/>
+          </a:ln>
+          <a:effectLst/>
+          <a:extLst>
+            <a:ext uri="{909E8E84-426E-40DD-AFC4-6F175D3DCCD1}">
+              <a14:hiddenFill xmlns:a14="http://schemas.microsoft.com/office/drawing/2010/main">
+                <a:solidFill>
+                  <a:srgbClr val="FFFFFF"/>
+                </a:solidFill>
+              </a14:hiddenFill>
+            </a:ext>
+            <a:ext uri="{91240B29-F687-4F45-9708-019B960494DF}">
+              <a14:hiddenLine xmlns:a14="http://schemas.microsoft.com/office/drawing/2010/main" w="9525" algn="in">
+                <a:solidFill>
+                  <a:srgbClr val="000000"/>
+                </a:solidFill>
+                <a:miter lim="800000"/>
+                <a:headEnd/>
+                <a:tailEnd/>
+              </a14:hiddenLine>
+            </a:ext>
+            <a:ext uri="{AF507438-7753-43E0-B8FC-AC1667EBCBE1}">
+              <a14:hiddenEffects xmlns:a14="http://schemas.microsoft.com/office/drawing/2010/main">
+                <a:effectLst>
+                  <a:outerShdw dist="35921" dir="2700000" algn="ctr" rotWithShape="0">
+                    <a:srgbClr val="FFC000"/>
+                  </a:outerShdw>
+                </a:effectLst>
+              </a14:hiddenEffects>
+            </a:ext>
+          </a:extLst>
+        </p:spPr>
+        <p:txBody>
+          <a:bodyPr vert="horz" wrap="square" lIns="36576" tIns="36576" rIns="36576" bIns="36576" numCol="1" anchor="t" anchorCtr="0" compatLnSpc="1">
+            <a:prstTxWarp prst="textNoShape">
+              <a:avLst/>
+            </a:prstTxWarp>
+          </a:bodyPr>
+          <a:lstStyle/>
+          <a:p>
+            <a:pPr marL="0" marR="0" lvl="0" indent="0" algn="ctr" defTabSz="914400" rtl="0" eaLnBrk="0" fontAlgn="base" latinLnBrk="0" hangingPunct="0">
+              <a:lnSpc>
+                <a:spcPct val="100000"/>
+              </a:lnSpc>
+              <a:spcBef>
+                <a:spcPct val="0"/>
+              </a:spcBef>
+              <a:spcAft>
+                <a:spcPct val="0"/>
+              </a:spcAft>
+              <a:buClrTx/>
+              <a:buSzTx/>
+              <a:buFontTx/>
+              <a:buNone/>
+              <a:tabLst/>
+            </a:pPr>
+            <a:r>
+              <a:rPr kumimoji="0" lang="en-US" altLang="en-US" sz="7200" b="0" i="0" u="none" strike="noStrike" cap="none" normalizeH="0" baseline="0" dirty="0">
+                <a:ln>
+                  <a:noFill/>
+                </a:ln>
+                <a:solidFill>
+                  <a:srgbClr val="000000"/>
+                </a:solidFill>
+                <a:effectLst/>
+                <a:latin typeface="Cambria" panose="02040503050406030204" pitchFamily="18" charset="0"/>
+              </a:rPr>
+              <a:t>Samuel Teplov</a:t>
+            </a:r>
+            <a:r>
+              <a:rPr lang="en-US" altLang="en-US" sz="7200" dirty="0">
+                <a:solidFill>
+                  <a:srgbClr val="000000"/>
+                </a:solidFill>
+                <a:latin typeface="Cambria" panose="02040503050406030204" pitchFamily="18" charset="0"/>
+              </a:rPr>
+              <a:t>, </a:t>
+            </a:r>
+            <a:r>
+              <a:rPr kumimoji="0" lang="en-US" altLang="en-US" sz="7200" b="0" i="0" u="none" strike="noStrike" cap="none" normalizeH="0" baseline="0" dirty="0">
+                <a:ln>
+                  <a:noFill/>
+                </a:ln>
+                <a:solidFill>
+                  <a:srgbClr val="000000"/>
+                </a:solidFill>
+                <a:effectLst/>
+                <a:latin typeface="Cambria" panose="02040503050406030204" pitchFamily="18" charset="0"/>
+              </a:rPr>
+              <a:t>Gaurav Deshpande</a:t>
+            </a:r>
+            <a:r>
+              <a:rPr lang="en-US" altLang="en-US" sz="7200" dirty="0">
+                <a:solidFill>
+                  <a:srgbClr val="000000"/>
+                </a:solidFill>
+                <a:latin typeface="Cambria" panose="02040503050406030204" pitchFamily="18" charset="0"/>
+              </a:rPr>
+              <a:t>, </a:t>
+            </a:r>
+            <a:r>
+              <a:rPr kumimoji="0" lang="en-US" altLang="en-US" sz="7200" b="0" i="0" u="none" strike="noStrike" cap="none" normalizeH="0" baseline="0" dirty="0">
+                <a:ln>
+                  <a:noFill/>
+                </a:ln>
+                <a:solidFill>
+                  <a:srgbClr val="000000"/>
+                </a:solidFill>
+                <a:effectLst/>
+                <a:latin typeface="Cambria" panose="02040503050406030204" pitchFamily="18" charset="0"/>
+              </a:rPr>
+              <a:t>Alon Peer</a:t>
+            </a:r>
+          </a:p>
+          <a:p>
+            <a:pPr marL="0" marR="0" lvl="0" indent="0" algn="ctr" defTabSz="914400" rtl="0" eaLnBrk="0" fontAlgn="base" latinLnBrk="0" hangingPunct="0">
+              <a:lnSpc>
+                <a:spcPct val="100000"/>
+              </a:lnSpc>
+              <a:spcBef>
+                <a:spcPct val="0"/>
+              </a:spcBef>
+              <a:spcAft>
+                <a:spcPct val="0"/>
+              </a:spcAft>
+              <a:buClrTx/>
+              <a:buSzTx/>
+              <a:buFontTx/>
+              <a:buNone/>
+              <a:tabLst/>
+            </a:pPr>
+            <a:r>
+              <a:rPr lang="en-US" altLang="en-US" sz="7200" dirty="0">
+                <a:solidFill>
+                  <a:srgbClr val="000000"/>
+                </a:solidFill>
+                <a:latin typeface="Cambria" panose="02040503050406030204" pitchFamily="18" charset="0"/>
+              </a:rPr>
+              <a:t>Faculty Advisor: Dr. Nicolas Christin</a:t>
+            </a:r>
+            <a:endParaRPr kumimoji="0" lang="en-US" altLang="en-US" sz="2800" b="0" i="0" u="none" strike="noStrike" cap="none" normalizeH="0" baseline="0" dirty="0">
+              <a:ln>
+                <a:noFill/>
+              </a:ln>
+              <a:solidFill>
+                <a:schemeClr val="tx1"/>
+              </a:solidFill>
+              <a:effectLst/>
+              <a:latin typeface="Arial" panose="020B0604020202020204" pitchFamily="34" charset="0"/>
+            </a:endParaRPr>
+          </a:p>
+        </p:txBody>
+      </p:sp>
+      <p:sp>
+        <p:nvSpPr>
+          <p:cNvPr id="7" name="TextBox 6">
+            <a:extLst>
+              <a:ext uri="{FF2B5EF4-FFF2-40B4-BE49-F238E27FC236}">
+                <a16:creationId xmlns:a16="http://schemas.microsoft.com/office/drawing/2014/main" id="{1E316277-438D-3044-BD47-0984A42438AC}"/>
+              </a:ext>
+            </a:extLst>
+          </p:cNvPr>
+          <p:cNvSpPr txBox="1"/>
+          <p:nvPr/>
+        </p:nvSpPr>
+        <p:spPr>
+          <a:xfrm>
+            <a:off x="457200" y="6260347"/>
+            <a:ext cx="18026743" cy="7417415"/>
+          </a:xfrm>
+          <a:prstGeom prst="rect">
+            <a:avLst/>
+          </a:prstGeom>
+          <a:noFill/>
+        </p:spPr>
+        <p:txBody>
+          <a:bodyPr wrap="square" rtlCol="0">
+            <a:spAutoFit/>
+          </a:bodyPr>
+          <a:lstStyle/>
+          <a:p>
+            <a:pPr algn="ctr"/>
+            <a:r>
+              <a:rPr lang="en-US" sz="8000" dirty="0"/>
+              <a:t>Problem Statement</a:t>
+            </a:r>
+          </a:p>
+          <a:p>
+            <a:pPr marL="685800" indent="-685800" fontAlgn="base">
+              <a:buFont typeface="Arial" panose="020B0604020202020204" pitchFamily="34" charset="0"/>
+              <a:buChar char="•"/>
+            </a:pPr>
+            <a:r>
+              <a:rPr lang="en-US" sz="4400" dirty="0"/>
+              <a:t>Misinformation has become a normal occurrence in our interconnected society with nation states, extremist organizations, and fringe web communities all contributing to the current state of disarray.</a:t>
+            </a:r>
+          </a:p>
+          <a:p>
+            <a:pPr marL="685800" indent="-685800" fontAlgn="base">
+              <a:buFont typeface="Arial" panose="020B0604020202020204" pitchFamily="34" charset="0"/>
+              <a:buChar char="•"/>
+            </a:pPr>
+            <a:r>
+              <a:rPr lang="en-US" sz="4400" dirty="0"/>
+              <a:t>Most research on fake news detection thus far has focused on detection after dissemination, which proves to be problematic since some people will still be affected.</a:t>
+            </a:r>
+          </a:p>
+          <a:p>
+            <a:pPr marL="685800" indent="-685800">
+              <a:buFont typeface="Arial" panose="020B0604020202020204" pitchFamily="34" charset="0"/>
+              <a:buChar char="•"/>
+            </a:pPr>
+            <a:r>
+              <a:rPr lang="en-US" sz="4400" dirty="0"/>
+              <a:t>Some researchers have suggested that future work in this field should focus on early fake news detection so that before a news story becomes viral, it can already be flagged as possible misinformation or as unverified.</a:t>
+            </a:r>
+            <a:endParaRPr lang="en-US" sz="28700" dirty="0"/>
+          </a:p>
+        </p:txBody>
+      </p:sp>
+      <p:sp>
+        <p:nvSpPr>
+          <p:cNvPr id="10" name="TextBox 9">
+            <a:extLst>
+              <a:ext uri="{FF2B5EF4-FFF2-40B4-BE49-F238E27FC236}">
+                <a16:creationId xmlns:a16="http://schemas.microsoft.com/office/drawing/2014/main" id="{F5714FCD-56DF-D041-943C-43A1D0B928E2}"/>
+              </a:ext>
+            </a:extLst>
+          </p:cNvPr>
+          <p:cNvSpPr txBox="1"/>
+          <p:nvPr/>
+        </p:nvSpPr>
+        <p:spPr>
+          <a:xfrm>
+            <a:off x="457199" y="13632242"/>
+            <a:ext cx="18026743" cy="7417415"/>
+          </a:xfrm>
+          <a:prstGeom prst="rect">
+            <a:avLst/>
+          </a:prstGeom>
+          <a:noFill/>
+        </p:spPr>
+        <p:txBody>
+          <a:bodyPr wrap="square" rtlCol="0">
+            <a:spAutoFit/>
+          </a:bodyPr>
+          <a:lstStyle/>
+          <a:p>
+            <a:pPr algn="ctr"/>
+            <a:r>
+              <a:rPr lang="en-US" sz="8000" dirty="0"/>
+              <a:t>Objective</a:t>
+            </a:r>
+          </a:p>
+          <a:p>
+            <a:pPr marL="685800" indent="-685800" fontAlgn="base">
+              <a:buFont typeface="Arial" panose="020B0604020202020204" pitchFamily="34" charset="0"/>
+              <a:buChar char="•"/>
+            </a:pPr>
+            <a:r>
+              <a:rPr lang="en-US" sz="4400" dirty="0"/>
+              <a:t>For progress to be made on classifying misinformation prior to becoming viral , a deeper understanding of news syndication and propagation is required.</a:t>
+            </a:r>
+          </a:p>
+          <a:p>
+            <a:pPr marL="685800" indent="-685800" fontAlgn="base">
+              <a:buFont typeface="Arial" panose="020B0604020202020204" pitchFamily="34" charset="0"/>
+              <a:buChar char="•"/>
+            </a:pPr>
+            <a:r>
+              <a:rPr lang="en-US" sz="4400" dirty="0"/>
+              <a:t>In our research we present novel ways of defining different types of news propagation, as well as illustrating patterns that arise from the way in which news articles propagate.</a:t>
+            </a:r>
+          </a:p>
+          <a:p>
+            <a:pPr marL="685800" indent="-685800" fontAlgn="base">
+              <a:buFont typeface="Arial" panose="020B0604020202020204" pitchFamily="34" charset="0"/>
+              <a:buChar char="•"/>
+            </a:pPr>
+            <a:r>
+              <a:rPr lang="en-US" sz="4400" dirty="0"/>
+              <a:t>Our goal is to lay the groundwork and provide the needed background information in order to enable the early detection and classification of misinformation.</a:t>
+            </a:r>
+          </a:p>
+        </p:txBody>
+      </p:sp>
+      <p:sp>
+        <p:nvSpPr>
+          <p:cNvPr id="11" name="TextBox 10">
+            <a:extLst>
+              <a:ext uri="{FF2B5EF4-FFF2-40B4-BE49-F238E27FC236}">
+                <a16:creationId xmlns:a16="http://schemas.microsoft.com/office/drawing/2014/main" id="{D3317FAB-8872-6341-AF4D-72549947BEC3}"/>
+              </a:ext>
+            </a:extLst>
+          </p:cNvPr>
+          <p:cNvSpPr txBox="1"/>
+          <p:nvPr/>
+        </p:nvSpPr>
+        <p:spPr>
+          <a:xfrm>
+            <a:off x="457198" y="20559875"/>
+            <a:ext cx="18026743" cy="5386090"/>
+          </a:xfrm>
+          <a:prstGeom prst="rect">
+            <a:avLst/>
+          </a:prstGeom>
+          <a:noFill/>
+        </p:spPr>
+        <p:txBody>
+          <a:bodyPr wrap="square" rtlCol="0">
+            <a:spAutoFit/>
+          </a:bodyPr>
+          <a:lstStyle/>
+          <a:p>
+            <a:pPr algn="ctr"/>
+            <a:r>
+              <a:rPr lang="en-US" sz="8000" dirty="0"/>
+              <a:t>Background</a:t>
+            </a:r>
+          </a:p>
+          <a:p>
+            <a:pPr marL="571500" indent="-571500" fontAlgn="base">
+              <a:buFont typeface="Arial" panose="020B0604020202020204" pitchFamily="34" charset="0"/>
+              <a:buChar char="•"/>
+            </a:pPr>
+            <a:r>
+              <a:rPr lang="en-US" sz="4400" dirty="0" err="1"/>
+              <a:t>Zannettou</a:t>
+            </a:r>
+            <a:r>
+              <a:rPr lang="en-US" sz="4400" dirty="0"/>
+              <a:t> et al. showed that memes originally posted by fringe web communities can eventually make their way into the mainstream media over time.</a:t>
+            </a:r>
+          </a:p>
+          <a:p>
+            <a:pPr marL="571500" indent="-571500">
+              <a:buFont typeface="Arial" panose="020B0604020202020204" pitchFamily="34" charset="0"/>
+              <a:buChar char="•"/>
+            </a:pPr>
+            <a:r>
+              <a:rPr lang="en-US" sz="4400" dirty="0"/>
+              <a:t>Wang et al. analyzed the propagation of news articles in Chinese media and categorized various features associated with the way news spreads , as well as compared online news propagation to the spread of an epidemic.</a:t>
+            </a:r>
+            <a:endParaRPr lang="en-US" sz="8800" dirty="0"/>
+          </a:p>
+        </p:txBody>
+      </p:sp>
+      <p:sp>
+        <p:nvSpPr>
+          <p:cNvPr id="12" name="TextBox 11">
+            <a:extLst>
+              <a:ext uri="{FF2B5EF4-FFF2-40B4-BE49-F238E27FC236}">
+                <a16:creationId xmlns:a16="http://schemas.microsoft.com/office/drawing/2014/main" id="{A893CD7C-C670-B645-AE78-1698553DCD12}"/>
+              </a:ext>
+            </a:extLst>
+          </p:cNvPr>
+          <p:cNvSpPr txBox="1"/>
+          <p:nvPr/>
+        </p:nvSpPr>
+        <p:spPr>
+          <a:xfrm>
+            <a:off x="457198" y="25945965"/>
+            <a:ext cx="18026743" cy="4031873"/>
+          </a:xfrm>
+          <a:prstGeom prst="rect">
+            <a:avLst/>
+          </a:prstGeom>
+          <a:noFill/>
+        </p:spPr>
+        <p:txBody>
+          <a:bodyPr wrap="square" rtlCol="0">
+            <a:spAutoFit/>
+          </a:bodyPr>
+          <a:lstStyle/>
+          <a:p>
+            <a:pPr algn="ctr"/>
+            <a:r>
+              <a:rPr lang="en-US" sz="8000" dirty="0"/>
+              <a:t>Future Work</a:t>
+            </a:r>
+          </a:p>
+          <a:p>
+            <a:pPr marL="571500" indent="-571500" fontAlgn="base">
+              <a:buFont typeface="Arial" panose="020B0604020202020204" pitchFamily="34" charset="0"/>
+              <a:buChar char="•"/>
+            </a:pPr>
+            <a:r>
+              <a:rPr lang="en-US" sz="4400" dirty="0"/>
+              <a:t>Create an automatic process to classify the different types of propagation that are occurring using some of the heuristics that we have identified.</a:t>
+            </a:r>
+          </a:p>
+          <a:p>
+            <a:pPr marL="571500" indent="-571500" fontAlgn="base">
+              <a:buFont typeface="Arial" panose="020B0604020202020204" pitchFamily="34" charset="0"/>
+              <a:buChar char="•"/>
+            </a:pPr>
+            <a:r>
+              <a:rPr lang="en-US" sz="4400" dirty="0"/>
+              <a:t>Create a system which can identify an article that has not been verified as correct and could possibly be misinformation. </a:t>
+            </a:r>
+          </a:p>
+        </p:txBody>
+      </p:sp>
+      <p:sp>
+        <p:nvSpPr>
+          <p:cNvPr id="14" name="TextBox 13">
+            <a:extLst>
+              <a:ext uri="{FF2B5EF4-FFF2-40B4-BE49-F238E27FC236}">
+                <a16:creationId xmlns:a16="http://schemas.microsoft.com/office/drawing/2014/main" id="{7A18D6A0-E870-CE41-97BC-B83CD40B35F6}"/>
+              </a:ext>
+            </a:extLst>
+          </p:cNvPr>
+          <p:cNvSpPr txBox="1"/>
+          <p:nvPr/>
+        </p:nvSpPr>
+        <p:spPr>
+          <a:xfrm>
+            <a:off x="21717000" y="6100117"/>
+            <a:ext cx="18026743" cy="1323439"/>
+          </a:xfrm>
+          <a:prstGeom prst="rect">
+            <a:avLst/>
+          </a:prstGeom>
+          <a:noFill/>
+        </p:spPr>
+        <p:txBody>
+          <a:bodyPr wrap="square" rtlCol="0">
+            <a:spAutoFit/>
+          </a:bodyPr>
+          <a:lstStyle/>
+          <a:p>
+            <a:pPr algn="ctr"/>
+            <a:r>
+              <a:rPr lang="en-US" sz="8000" dirty="0"/>
+              <a:t>Methodology</a:t>
+            </a:r>
+          </a:p>
+        </p:txBody>
+      </p:sp>
+      <p:sp>
+        <p:nvSpPr>
+          <p:cNvPr id="8" name="Rectangle 7">
+            <a:extLst>
+              <a:ext uri="{FF2B5EF4-FFF2-40B4-BE49-F238E27FC236}">
+                <a16:creationId xmlns:a16="http://schemas.microsoft.com/office/drawing/2014/main" id="{47340900-17EC-4C43-AE35-16E27BB6136C}"/>
+              </a:ext>
+            </a:extLst>
+          </p:cNvPr>
+          <p:cNvSpPr/>
+          <p:nvPr/>
+        </p:nvSpPr>
+        <p:spPr>
+          <a:xfrm>
+            <a:off x="18483941" y="6242698"/>
+            <a:ext cx="24492859" cy="24759816"/>
+          </a:xfrm>
+          <a:prstGeom prst="rect">
+            <a:avLst/>
+          </a:prstGeom>
+          <a:noFill/>
+          <a:ln>
+            <a:solidFill>
+              <a:schemeClr val="tx1"/>
+            </a:solidFill>
+          </a:ln>
+        </p:spPr>
+        <p:style>
+          <a:lnRef idx="2">
+            <a:schemeClr val="accent1">
+              <a:shade val="50000"/>
+            </a:schemeClr>
+          </a:lnRef>
+          <a:fillRef idx="1">
+            <a:schemeClr val="accent1"/>
+          </a:fillRef>
+          <a:effectRef idx="0">
+            <a:schemeClr val="accent1"/>
+          </a:effectRef>
+          <a:fontRef idx="minor">
+            <a:schemeClr val="lt1"/>
+          </a:fontRef>
+        </p:style>
+        <p:txBody>
+          <a:bodyPr rtlCol="0" anchor="ctr"/>
+          <a:lstStyle/>
+          <a:p>
+            <a:pPr algn="ctr"/>
+            <a:endParaRPr lang="en-US"/>
+          </a:p>
+        </p:txBody>
+      </p:sp>
+      <p:sp>
+        <p:nvSpPr>
+          <p:cNvPr id="37" name="TextBox 36">
+            <a:extLst>
+              <a:ext uri="{FF2B5EF4-FFF2-40B4-BE49-F238E27FC236}">
+                <a16:creationId xmlns:a16="http://schemas.microsoft.com/office/drawing/2014/main" id="{A4C4987D-DC34-8946-8979-9BA9BD64DE49}"/>
+              </a:ext>
+            </a:extLst>
+          </p:cNvPr>
+          <p:cNvSpPr txBox="1"/>
+          <p:nvPr/>
+        </p:nvSpPr>
+        <p:spPr>
+          <a:xfrm>
+            <a:off x="18814507" y="7423556"/>
+            <a:ext cx="6421214" cy="2431435"/>
+          </a:xfrm>
+          <a:prstGeom prst="rect">
+            <a:avLst/>
+          </a:prstGeom>
+          <a:noFill/>
+          <a:ln>
+            <a:solidFill>
+              <a:schemeClr val="tx1"/>
+            </a:solidFill>
+          </a:ln>
+        </p:spPr>
+        <p:txBody>
+          <a:bodyPr wrap="square" rtlCol="0">
+            <a:spAutoFit/>
+          </a:bodyPr>
+          <a:lstStyle/>
+          <a:p>
+            <a:endParaRPr lang="en-US" sz="5400" dirty="0"/>
+          </a:p>
+          <a:p>
+            <a:pPr algn="ctr"/>
+            <a:r>
+              <a:rPr lang="en-US" sz="4400" dirty="0"/>
+              <a:t>Identification of Viral News</a:t>
+            </a:r>
+          </a:p>
+          <a:p>
+            <a:endParaRPr lang="en-US" sz="5400" dirty="0"/>
+          </a:p>
+        </p:txBody>
+      </p:sp>
+      <p:sp>
+        <p:nvSpPr>
+          <p:cNvPr id="38" name="Down Arrow 37">
+            <a:extLst>
+              <a:ext uri="{FF2B5EF4-FFF2-40B4-BE49-F238E27FC236}">
+                <a16:creationId xmlns:a16="http://schemas.microsoft.com/office/drawing/2014/main" id="{B308DA5A-F1AA-2240-BC1E-533AFB93EC4D}"/>
+              </a:ext>
+            </a:extLst>
+          </p:cNvPr>
+          <p:cNvSpPr/>
+          <p:nvPr/>
+        </p:nvSpPr>
+        <p:spPr>
+          <a:xfrm>
+            <a:off x="21382857" y="9847406"/>
+            <a:ext cx="1284514" cy="1671364"/>
+          </a:xfrm>
+          <a:prstGeom prst="downArrow">
+            <a:avLst/>
+          </a:prstGeom>
+        </p:spPr>
+        <p:style>
+          <a:lnRef idx="2">
+            <a:schemeClr val="accent1">
+              <a:shade val="50000"/>
+            </a:schemeClr>
+          </a:lnRef>
+          <a:fillRef idx="1">
+            <a:schemeClr val="accent1"/>
+          </a:fillRef>
+          <a:effectRef idx="0">
+            <a:schemeClr val="accent1"/>
+          </a:effectRef>
+          <a:fontRef idx="minor">
+            <a:schemeClr val="lt1"/>
+          </a:fontRef>
+        </p:style>
+        <p:txBody>
+          <a:bodyPr rtlCol="0" anchor="ctr"/>
+          <a:lstStyle/>
+          <a:p>
+            <a:pPr algn="ctr"/>
+            <a:endParaRPr lang="en-US"/>
+          </a:p>
+        </p:txBody>
+      </p:sp>
+      <p:sp>
+        <p:nvSpPr>
+          <p:cNvPr id="46" name="Down Arrow 45">
+            <a:extLst>
+              <a:ext uri="{FF2B5EF4-FFF2-40B4-BE49-F238E27FC236}">
+                <a16:creationId xmlns:a16="http://schemas.microsoft.com/office/drawing/2014/main" id="{85E75C29-BD66-9447-A37F-244EFC642BE6}"/>
+              </a:ext>
+            </a:extLst>
+          </p:cNvPr>
+          <p:cNvSpPr/>
+          <p:nvPr/>
+        </p:nvSpPr>
+        <p:spPr>
+          <a:xfrm>
+            <a:off x="21429123" y="13982503"/>
+            <a:ext cx="1284514" cy="1671364"/>
+          </a:xfrm>
+          <a:prstGeom prst="downArrow">
+            <a:avLst/>
+          </a:prstGeom>
+        </p:spPr>
+        <p:style>
+          <a:lnRef idx="2">
+            <a:schemeClr val="accent1">
+              <a:shade val="50000"/>
+            </a:schemeClr>
+          </a:lnRef>
+          <a:fillRef idx="1">
+            <a:schemeClr val="accent1"/>
+          </a:fillRef>
+          <a:effectRef idx="0">
+            <a:schemeClr val="accent1"/>
+          </a:effectRef>
+          <a:fontRef idx="minor">
+            <a:schemeClr val="lt1"/>
+          </a:fontRef>
+        </p:style>
+        <p:txBody>
+          <a:bodyPr rtlCol="0" anchor="ctr"/>
+          <a:lstStyle/>
+          <a:p>
+            <a:pPr algn="ctr"/>
+            <a:endParaRPr lang="en-US"/>
+          </a:p>
+        </p:txBody>
+      </p:sp>
+      <p:sp>
+        <p:nvSpPr>
+          <p:cNvPr id="47" name="Down Arrow 46">
+            <a:extLst>
+              <a:ext uri="{FF2B5EF4-FFF2-40B4-BE49-F238E27FC236}">
+                <a16:creationId xmlns:a16="http://schemas.microsoft.com/office/drawing/2014/main" id="{16B100F4-D20D-B843-8895-98A11E7C36CE}"/>
+              </a:ext>
+            </a:extLst>
+          </p:cNvPr>
+          <p:cNvSpPr/>
+          <p:nvPr/>
+        </p:nvSpPr>
+        <p:spPr>
+          <a:xfrm>
+            <a:off x="21382857" y="18135803"/>
+            <a:ext cx="1284514" cy="1671364"/>
+          </a:xfrm>
+          <a:prstGeom prst="downArrow">
+            <a:avLst/>
+          </a:prstGeom>
+        </p:spPr>
+        <p:style>
+          <a:lnRef idx="2">
+            <a:schemeClr val="accent1">
+              <a:shade val="50000"/>
+            </a:schemeClr>
+          </a:lnRef>
+          <a:fillRef idx="1">
+            <a:schemeClr val="accent1"/>
+          </a:fillRef>
+          <a:effectRef idx="0">
+            <a:schemeClr val="accent1"/>
+          </a:effectRef>
+          <a:fontRef idx="minor">
+            <a:schemeClr val="lt1"/>
+          </a:fontRef>
+        </p:style>
+        <p:txBody>
+          <a:bodyPr rtlCol="0" anchor="ctr"/>
+          <a:lstStyle/>
+          <a:p>
+            <a:pPr algn="ctr"/>
+            <a:endParaRPr lang="en-US"/>
+          </a:p>
+        </p:txBody>
+      </p:sp>
+      <p:sp>
+        <p:nvSpPr>
+          <p:cNvPr id="48" name="Down Arrow 47">
+            <a:extLst>
+              <a:ext uri="{FF2B5EF4-FFF2-40B4-BE49-F238E27FC236}">
+                <a16:creationId xmlns:a16="http://schemas.microsoft.com/office/drawing/2014/main" id="{4B889E82-D3E2-3149-9484-8CEB22B2C3D7}"/>
+              </a:ext>
+            </a:extLst>
+          </p:cNvPr>
+          <p:cNvSpPr/>
+          <p:nvPr/>
+        </p:nvSpPr>
+        <p:spPr>
+          <a:xfrm>
+            <a:off x="21429123" y="22304643"/>
+            <a:ext cx="1284514" cy="1671364"/>
+          </a:xfrm>
+          <a:prstGeom prst="downArrow">
+            <a:avLst/>
+          </a:prstGeom>
+        </p:spPr>
+        <p:style>
+          <a:lnRef idx="2">
+            <a:schemeClr val="accent1">
+              <a:shade val="50000"/>
+            </a:schemeClr>
+          </a:lnRef>
+          <a:fillRef idx="1">
+            <a:schemeClr val="accent1"/>
+          </a:fillRef>
+          <a:effectRef idx="0">
+            <a:schemeClr val="accent1"/>
+          </a:effectRef>
+          <a:fontRef idx="minor">
+            <a:schemeClr val="lt1"/>
+          </a:fontRef>
+        </p:style>
+        <p:txBody>
+          <a:bodyPr rtlCol="0" anchor="ctr"/>
+          <a:lstStyle/>
+          <a:p>
+            <a:pPr algn="ctr"/>
+            <a:endParaRPr lang="en-US"/>
+          </a:p>
+        </p:txBody>
+      </p:sp>
+      <p:sp>
+        <p:nvSpPr>
+          <p:cNvPr id="51" name="TextBox 50">
+            <a:extLst>
+              <a:ext uri="{FF2B5EF4-FFF2-40B4-BE49-F238E27FC236}">
+                <a16:creationId xmlns:a16="http://schemas.microsoft.com/office/drawing/2014/main" id="{BD794D75-5BB3-064D-8964-64C3EB7EAF4C}"/>
+              </a:ext>
+            </a:extLst>
+          </p:cNvPr>
+          <p:cNvSpPr txBox="1"/>
+          <p:nvPr/>
+        </p:nvSpPr>
+        <p:spPr>
+          <a:xfrm>
+            <a:off x="18870298" y="11563962"/>
+            <a:ext cx="6421214" cy="2431435"/>
+          </a:xfrm>
+          <a:prstGeom prst="rect">
+            <a:avLst/>
+          </a:prstGeom>
+          <a:noFill/>
+          <a:ln>
+            <a:solidFill>
+              <a:schemeClr val="tx1"/>
+            </a:solidFill>
+          </a:ln>
+        </p:spPr>
+        <p:txBody>
+          <a:bodyPr wrap="square" rtlCol="0">
+            <a:spAutoFit/>
+          </a:bodyPr>
+          <a:lstStyle/>
+          <a:p>
+            <a:endParaRPr lang="en-US" sz="5400" dirty="0"/>
+          </a:p>
+          <a:p>
+            <a:pPr algn="ctr"/>
+            <a:r>
+              <a:rPr lang="en-US" sz="4400" dirty="0"/>
+              <a:t>Gathering Similar Articles</a:t>
+            </a:r>
+          </a:p>
+          <a:p>
+            <a:endParaRPr lang="en-US" sz="5400" dirty="0"/>
+          </a:p>
+        </p:txBody>
+      </p:sp>
+      <p:sp>
+        <p:nvSpPr>
+          <p:cNvPr id="52" name="TextBox 51">
+            <a:extLst>
+              <a:ext uri="{FF2B5EF4-FFF2-40B4-BE49-F238E27FC236}">
+                <a16:creationId xmlns:a16="http://schemas.microsoft.com/office/drawing/2014/main" id="{91822B81-995D-914A-8FB6-F9C5C9D80211}"/>
+              </a:ext>
+            </a:extLst>
+          </p:cNvPr>
+          <p:cNvSpPr txBox="1"/>
+          <p:nvPr/>
+        </p:nvSpPr>
+        <p:spPr>
+          <a:xfrm>
+            <a:off x="18814507" y="15704368"/>
+            <a:ext cx="6421214" cy="2431435"/>
+          </a:xfrm>
+          <a:prstGeom prst="rect">
+            <a:avLst/>
+          </a:prstGeom>
+          <a:noFill/>
+          <a:ln>
+            <a:solidFill>
+              <a:schemeClr val="tx1"/>
+            </a:solidFill>
+          </a:ln>
+        </p:spPr>
+        <p:txBody>
+          <a:bodyPr wrap="square" rtlCol="0">
+            <a:spAutoFit/>
+          </a:bodyPr>
+          <a:lstStyle/>
+          <a:p>
+            <a:endParaRPr lang="en-US" sz="5400" dirty="0"/>
+          </a:p>
+          <a:p>
+            <a:pPr algn="ctr"/>
+            <a:r>
+              <a:rPr lang="en-US" sz="4400" dirty="0"/>
+              <a:t>Web Scraping</a:t>
+            </a:r>
+          </a:p>
+          <a:p>
+            <a:endParaRPr lang="en-US" sz="5400" dirty="0"/>
+          </a:p>
+        </p:txBody>
+      </p:sp>
+      <p:sp>
+        <p:nvSpPr>
+          <p:cNvPr id="53" name="TextBox 52">
+            <a:extLst>
+              <a:ext uri="{FF2B5EF4-FFF2-40B4-BE49-F238E27FC236}">
+                <a16:creationId xmlns:a16="http://schemas.microsoft.com/office/drawing/2014/main" id="{BC1BE076-99A7-B34B-9AA2-E1E842D6A042}"/>
+              </a:ext>
+            </a:extLst>
+          </p:cNvPr>
+          <p:cNvSpPr txBox="1"/>
+          <p:nvPr/>
+        </p:nvSpPr>
+        <p:spPr>
+          <a:xfrm>
+            <a:off x="18870298" y="19862224"/>
+            <a:ext cx="6421214" cy="2431435"/>
+          </a:xfrm>
+          <a:prstGeom prst="rect">
+            <a:avLst/>
+          </a:prstGeom>
+          <a:noFill/>
+          <a:ln>
+            <a:solidFill>
+              <a:schemeClr val="tx1"/>
+            </a:solidFill>
+          </a:ln>
+        </p:spPr>
+        <p:txBody>
+          <a:bodyPr wrap="square" rtlCol="0">
+            <a:spAutoFit/>
+          </a:bodyPr>
+          <a:lstStyle/>
+          <a:p>
+            <a:endParaRPr lang="en-US" sz="5400" dirty="0"/>
+          </a:p>
+          <a:p>
+            <a:pPr algn="ctr"/>
+            <a:r>
+              <a:rPr lang="en-US" sz="4400" dirty="0"/>
+              <a:t>Pre-Processing</a:t>
+            </a:r>
+          </a:p>
+          <a:p>
+            <a:endParaRPr lang="en-US" sz="5400" dirty="0"/>
+          </a:p>
+        </p:txBody>
+      </p:sp>
+      <p:sp>
+        <p:nvSpPr>
+          <p:cNvPr id="54" name="TextBox 53">
+            <a:extLst>
+              <a:ext uri="{FF2B5EF4-FFF2-40B4-BE49-F238E27FC236}">
+                <a16:creationId xmlns:a16="http://schemas.microsoft.com/office/drawing/2014/main" id="{7EEF4777-F74E-0942-8448-B403BD98BFC8}"/>
+              </a:ext>
+            </a:extLst>
+          </p:cNvPr>
+          <p:cNvSpPr txBox="1"/>
+          <p:nvPr/>
+        </p:nvSpPr>
+        <p:spPr>
+          <a:xfrm>
+            <a:off x="18870298" y="24006436"/>
+            <a:ext cx="6421214" cy="2431435"/>
+          </a:xfrm>
+          <a:prstGeom prst="rect">
+            <a:avLst/>
+          </a:prstGeom>
+          <a:noFill/>
+          <a:ln>
+            <a:solidFill>
+              <a:schemeClr val="tx1"/>
+            </a:solidFill>
+          </a:ln>
+        </p:spPr>
+        <p:txBody>
+          <a:bodyPr wrap="square" rtlCol="0">
+            <a:spAutoFit/>
+          </a:bodyPr>
+          <a:lstStyle/>
+          <a:p>
+            <a:endParaRPr lang="en-US" sz="5400" dirty="0"/>
+          </a:p>
+          <a:p>
+            <a:pPr algn="ctr"/>
+            <a:r>
+              <a:rPr lang="en-US" sz="4400" dirty="0"/>
+              <a:t>Clustering</a:t>
+            </a:r>
+          </a:p>
+          <a:p>
+            <a:endParaRPr lang="en-US" sz="5400" dirty="0"/>
+          </a:p>
+        </p:txBody>
+      </p:sp>
+      <p:sp>
+        <p:nvSpPr>
+          <p:cNvPr id="55" name="TextBox 54">
+            <a:extLst>
+              <a:ext uri="{FF2B5EF4-FFF2-40B4-BE49-F238E27FC236}">
+                <a16:creationId xmlns:a16="http://schemas.microsoft.com/office/drawing/2014/main" id="{B90A098C-4CCF-D640-9D99-B51F7011A5BD}"/>
+              </a:ext>
+            </a:extLst>
+          </p:cNvPr>
+          <p:cNvSpPr txBox="1"/>
+          <p:nvPr/>
+        </p:nvSpPr>
+        <p:spPr>
+          <a:xfrm>
+            <a:off x="18745793" y="28198066"/>
+            <a:ext cx="6421214" cy="2431435"/>
+          </a:xfrm>
+          <a:prstGeom prst="rect">
+            <a:avLst/>
+          </a:prstGeom>
+          <a:noFill/>
+          <a:ln>
+            <a:solidFill>
+              <a:schemeClr val="tx1"/>
+            </a:solidFill>
+          </a:ln>
+        </p:spPr>
+        <p:txBody>
+          <a:bodyPr wrap="square" rtlCol="0">
+            <a:spAutoFit/>
+          </a:bodyPr>
+          <a:lstStyle/>
+          <a:p>
+            <a:endParaRPr lang="en-US" sz="5400" dirty="0"/>
+          </a:p>
+          <a:p>
+            <a:pPr algn="ctr"/>
+            <a:r>
+              <a:rPr lang="en-US" sz="4400" dirty="0"/>
+              <a:t>Analysis</a:t>
+            </a:r>
+          </a:p>
+          <a:p>
+            <a:endParaRPr lang="en-US" sz="5400" dirty="0"/>
+          </a:p>
+        </p:txBody>
+      </p:sp>
+      <p:sp>
+        <p:nvSpPr>
+          <p:cNvPr id="56" name="Down Arrow 55">
+            <a:extLst>
+              <a:ext uri="{FF2B5EF4-FFF2-40B4-BE49-F238E27FC236}">
+                <a16:creationId xmlns:a16="http://schemas.microsoft.com/office/drawing/2014/main" id="{D8B4C0F3-B326-5842-BBC3-C7787D96A085}"/>
+              </a:ext>
+            </a:extLst>
+          </p:cNvPr>
+          <p:cNvSpPr/>
+          <p:nvPr/>
+        </p:nvSpPr>
+        <p:spPr>
+          <a:xfrm>
+            <a:off x="21382857" y="26486964"/>
+            <a:ext cx="1284514" cy="1671364"/>
+          </a:xfrm>
+          <a:prstGeom prst="downArrow">
+            <a:avLst/>
+          </a:prstGeom>
+        </p:spPr>
+        <p:style>
+          <a:lnRef idx="2">
+            <a:schemeClr val="accent1">
+              <a:shade val="50000"/>
+            </a:schemeClr>
+          </a:lnRef>
+          <a:fillRef idx="1">
+            <a:schemeClr val="accent1"/>
+          </a:fillRef>
+          <a:effectRef idx="0">
+            <a:schemeClr val="accent1"/>
+          </a:effectRef>
+          <a:fontRef idx="minor">
+            <a:schemeClr val="lt1"/>
+          </a:fontRef>
+        </p:style>
+        <p:txBody>
+          <a:bodyPr rtlCol="0" anchor="ctr"/>
+          <a:lstStyle/>
+          <a:p>
+            <a:pPr algn="ctr"/>
+            <a:endParaRPr lang="en-US"/>
+          </a:p>
+        </p:txBody>
+      </p:sp>
+      <p:pic>
+        <p:nvPicPr>
+          <p:cNvPr id="1030" name="Picture 6">
+            <a:extLst>
+              <a:ext uri="{FF2B5EF4-FFF2-40B4-BE49-F238E27FC236}">
+                <a16:creationId xmlns:a16="http://schemas.microsoft.com/office/drawing/2014/main" id="{B33B4F78-A4B7-0C49-A1F1-9DEBDE57863A}"/>
+              </a:ext>
+            </a:extLst>
+          </p:cNvPr>
+          <p:cNvPicPr>
+            <a:picLocks noChangeAspect="1" noChangeArrowheads="1"/>
+          </p:cNvPicPr>
+          <p:nvPr/>
+        </p:nvPicPr>
+        <p:blipFill>
+          <a:blip r:embed="rId2">
+            <a:extLst>
+              <a:ext uri="{28A0092B-C50C-407E-A947-70E740481C1C}">
+                <a14:useLocalDpi xmlns:a14="http://schemas.microsoft.com/office/drawing/2010/main" val="0"/>
+              </a:ext>
+            </a:extLst>
+          </a:blip>
+          <a:srcRect/>
+          <a:stretch>
+            <a:fillRect/>
+          </a:stretch>
+        </p:blipFill>
+        <p:spPr bwMode="auto">
+          <a:xfrm>
+            <a:off x="34518117" y="6933167"/>
+            <a:ext cx="6421215" cy="3840391"/>
+          </a:xfrm>
+          <a:prstGeom prst="rect">
+            <a:avLst/>
+          </a:prstGeom>
+          <a:noFill/>
+          <a:extLst>
+            <a:ext uri="{909E8E84-426E-40DD-AFC4-6F175D3DCCD1}">
+              <a14:hiddenFill xmlns:a14="http://schemas.microsoft.com/office/drawing/2010/main">
+                <a:solidFill>
+                  <a:srgbClr val="FFFFFF"/>
+                </a:solidFill>
+              </a14:hiddenFill>
+            </a:ext>
+          </a:extLst>
+        </p:spPr>
+      </p:pic>
+      <p:pic>
+        <p:nvPicPr>
+          <p:cNvPr id="1032" name="Picture 8">
+            <a:extLst>
+              <a:ext uri="{FF2B5EF4-FFF2-40B4-BE49-F238E27FC236}">
+                <a16:creationId xmlns:a16="http://schemas.microsoft.com/office/drawing/2014/main" id="{E55BCDF6-5A3B-3D47-8BCC-E29841DFE10E}"/>
+              </a:ext>
+            </a:extLst>
+          </p:cNvPr>
+          <p:cNvPicPr>
+            <a:picLocks noChangeAspect="1" noChangeArrowheads="1"/>
+          </p:cNvPicPr>
+          <p:nvPr/>
+        </p:nvPicPr>
+        <p:blipFill>
+          <a:blip r:embed="rId3">
+            <a:extLst>
+              <a:ext uri="{28A0092B-C50C-407E-A947-70E740481C1C}">
+                <a14:useLocalDpi xmlns:a14="http://schemas.microsoft.com/office/drawing/2010/main" val="0"/>
+              </a:ext>
+            </a:extLst>
+          </a:blip>
+          <a:srcRect/>
+          <a:stretch>
+            <a:fillRect/>
+          </a:stretch>
+        </p:blipFill>
+        <p:spPr bwMode="auto">
+          <a:xfrm>
+            <a:off x="29242561" y="13470089"/>
+            <a:ext cx="10015451" cy="3580524"/>
+          </a:xfrm>
+          <a:prstGeom prst="rect">
+            <a:avLst/>
+          </a:prstGeom>
+          <a:noFill/>
+          <a:extLst>
+            <a:ext uri="{909E8E84-426E-40DD-AFC4-6F175D3DCCD1}">
+              <a14:hiddenFill xmlns:a14="http://schemas.microsoft.com/office/drawing/2010/main">
+                <a:solidFill>
+                  <a:srgbClr val="FFFFFF"/>
+                </a:solidFill>
+              </a14:hiddenFill>
+            </a:ext>
+          </a:extLst>
+        </p:spPr>
+      </p:pic>
+      <p:pic>
+        <p:nvPicPr>
+          <p:cNvPr id="1034" name="Picture 10">
+            <a:extLst>
+              <a:ext uri="{FF2B5EF4-FFF2-40B4-BE49-F238E27FC236}">
+                <a16:creationId xmlns:a16="http://schemas.microsoft.com/office/drawing/2014/main" id="{8DB2E47D-D243-7A41-8E9E-5E32B321E1FD}"/>
+              </a:ext>
+            </a:extLst>
+          </p:cNvPr>
+          <p:cNvPicPr>
+            <a:picLocks noChangeAspect="1" noChangeArrowheads="1"/>
+          </p:cNvPicPr>
+          <p:nvPr/>
+        </p:nvPicPr>
+        <p:blipFill>
+          <a:blip r:embed="rId4">
+            <a:extLst>
+              <a:ext uri="{28A0092B-C50C-407E-A947-70E740481C1C}">
+                <a14:useLocalDpi xmlns:a14="http://schemas.microsoft.com/office/drawing/2010/main" val="0"/>
+              </a:ext>
+            </a:extLst>
+          </a:blip>
+          <a:srcRect/>
+          <a:stretch>
+            <a:fillRect/>
+          </a:stretch>
+        </p:blipFill>
+        <p:spPr bwMode="auto">
+          <a:xfrm>
+            <a:off x="33186652" y="11080335"/>
+            <a:ext cx="8381805" cy="2247371"/>
+          </a:xfrm>
+          <a:prstGeom prst="rect">
+            <a:avLst/>
+          </a:prstGeom>
+          <a:noFill/>
+          <a:extLst>
+            <a:ext uri="{909E8E84-426E-40DD-AFC4-6F175D3DCCD1}">
+              <a14:hiddenFill xmlns:a14="http://schemas.microsoft.com/office/drawing/2010/main">
+                <a:solidFill>
+                  <a:srgbClr val="FFFFFF"/>
+                </a:solidFill>
+              </a14:hiddenFill>
+            </a:ext>
+          </a:extLst>
+        </p:spPr>
+      </p:pic>
+      <p:pic>
+        <p:nvPicPr>
+          <p:cNvPr id="1036" name="Picture 12">
+            <a:extLst>
+              <a:ext uri="{FF2B5EF4-FFF2-40B4-BE49-F238E27FC236}">
+                <a16:creationId xmlns:a16="http://schemas.microsoft.com/office/drawing/2014/main" id="{FC2922A7-1B8B-0740-9F8B-15F4A8E98B95}"/>
+              </a:ext>
+            </a:extLst>
+          </p:cNvPr>
+          <p:cNvPicPr>
+            <a:picLocks noChangeAspect="1" noChangeArrowheads="1"/>
+          </p:cNvPicPr>
+          <p:nvPr/>
+        </p:nvPicPr>
+        <p:blipFill>
+          <a:blip r:embed="rId5">
+            <a:extLst>
+              <a:ext uri="{28A0092B-C50C-407E-A947-70E740481C1C}">
+                <a14:useLocalDpi xmlns:a14="http://schemas.microsoft.com/office/drawing/2010/main" val="0"/>
+              </a:ext>
+            </a:extLst>
+          </a:blip>
+          <a:srcRect/>
+          <a:stretch>
+            <a:fillRect/>
+          </a:stretch>
+        </p:blipFill>
+        <p:spPr bwMode="auto">
+          <a:xfrm>
+            <a:off x="27521498" y="10976067"/>
+            <a:ext cx="5209106" cy="2431435"/>
+          </a:xfrm>
+          <a:prstGeom prst="rect">
+            <a:avLst/>
+          </a:prstGeom>
+          <a:noFill/>
+          <a:extLst>
+            <a:ext uri="{909E8E84-426E-40DD-AFC4-6F175D3DCCD1}">
+              <a14:hiddenFill xmlns:a14="http://schemas.microsoft.com/office/drawing/2010/main">
+                <a:solidFill>
+                  <a:srgbClr val="FFFFFF"/>
+                </a:solidFill>
+              </a14:hiddenFill>
+            </a:ext>
+          </a:extLst>
+        </p:spPr>
+      </p:pic>
+      <p:pic>
+        <p:nvPicPr>
+          <p:cNvPr id="40" name="Picture 39" descr="A picture containing monitor, screen, clock, game&#10;&#10;Description automatically generated">
+            <a:extLst>
+              <a:ext uri="{FF2B5EF4-FFF2-40B4-BE49-F238E27FC236}">
+                <a16:creationId xmlns:a16="http://schemas.microsoft.com/office/drawing/2014/main" id="{3177A7AC-256B-5940-A95F-53EE3F7587EE}"/>
+              </a:ext>
+            </a:extLst>
+          </p:cNvPr>
+          <p:cNvPicPr>
+            <a:picLocks noChangeAspect="1"/>
+          </p:cNvPicPr>
+          <p:nvPr/>
+        </p:nvPicPr>
+        <p:blipFill rotWithShape="1">
+          <a:blip r:embed="rId6">
+            <a:extLst>
+              <a:ext uri="{28A0092B-C50C-407E-A947-70E740481C1C}">
+                <a14:useLocalDpi xmlns:a14="http://schemas.microsoft.com/office/drawing/2010/main" val="0"/>
+              </a:ext>
+            </a:extLst>
+          </a:blip>
+          <a:srcRect l="41183" t="41762"/>
+          <a:stretch/>
+        </p:blipFill>
+        <p:spPr>
+          <a:xfrm>
+            <a:off x="27271118" y="17733179"/>
+            <a:ext cx="7658248" cy="7417415"/>
+          </a:xfrm>
+          <a:prstGeom prst="rect">
+            <a:avLst/>
+          </a:prstGeom>
+        </p:spPr>
+      </p:pic>
+      <p:pic>
+        <p:nvPicPr>
+          <p:cNvPr id="58" name="Picture 57" descr="A close up of a screen&#10;&#10;Description automatically generated">
+            <a:extLst>
+              <a:ext uri="{FF2B5EF4-FFF2-40B4-BE49-F238E27FC236}">
+                <a16:creationId xmlns:a16="http://schemas.microsoft.com/office/drawing/2014/main" id="{4C25CBD0-2679-AA46-A7EE-DB869A3E782E}"/>
+              </a:ext>
+            </a:extLst>
+          </p:cNvPr>
+          <p:cNvPicPr>
+            <a:picLocks noChangeAspect="1"/>
+          </p:cNvPicPr>
+          <p:nvPr/>
+        </p:nvPicPr>
+        <p:blipFill rotWithShape="1">
+          <a:blip r:embed="rId7">
+            <a:extLst>
+              <a:ext uri="{28A0092B-C50C-407E-A947-70E740481C1C}">
+                <a14:useLocalDpi xmlns:a14="http://schemas.microsoft.com/office/drawing/2010/main" val="0"/>
+              </a:ext>
+            </a:extLst>
+          </a:blip>
+          <a:srcRect l="50731"/>
+          <a:stretch/>
+        </p:blipFill>
+        <p:spPr>
+          <a:xfrm>
+            <a:off x="35755485" y="17286475"/>
+            <a:ext cx="6663509" cy="7417416"/>
+          </a:xfrm>
+          <a:prstGeom prst="rect">
+            <a:avLst/>
+          </a:prstGeom>
+        </p:spPr>
+      </p:pic>
+      <p:pic>
+        <p:nvPicPr>
+          <p:cNvPr id="60" name="Picture 59" descr="A close up of a sign&#10;&#10;Description automatically generated">
+            <a:extLst>
+              <a:ext uri="{FF2B5EF4-FFF2-40B4-BE49-F238E27FC236}">
+                <a16:creationId xmlns:a16="http://schemas.microsoft.com/office/drawing/2014/main" id="{6E16C92D-76F3-F348-A975-6C4D93228BE6}"/>
+              </a:ext>
+            </a:extLst>
+          </p:cNvPr>
+          <p:cNvPicPr>
+            <a:picLocks noChangeAspect="1"/>
+          </p:cNvPicPr>
+          <p:nvPr/>
+        </p:nvPicPr>
+        <p:blipFill>
+          <a:blip r:embed="rId8">
+            <a:extLst>
+              <a:ext uri="{28A0092B-C50C-407E-A947-70E740481C1C}">
+                <a14:useLocalDpi xmlns:a14="http://schemas.microsoft.com/office/drawing/2010/main" val="0"/>
+              </a:ext>
+            </a:extLst>
+          </a:blip>
+          <a:stretch>
+            <a:fillRect/>
+          </a:stretch>
+        </p:blipFill>
+        <p:spPr>
+          <a:xfrm>
+            <a:off x="863040" y="504354"/>
+            <a:ext cx="3526713" cy="3526713"/>
+          </a:xfrm>
+          <a:prstGeom prst="rect">
+            <a:avLst/>
+          </a:prstGeom>
+        </p:spPr>
+      </p:pic>
+      <p:pic>
+        <p:nvPicPr>
+          <p:cNvPr id="67" name="Picture 66" descr="A close up of a sign&#10;&#10;Description automatically generated">
+            <a:extLst>
+              <a:ext uri="{FF2B5EF4-FFF2-40B4-BE49-F238E27FC236}">
+                <a16:creationId xmlns:a16="http://schemas.microsoft.com/office/drawing/2014/main" id="{4E71B500-B2C7-FA44-A3DE-C3CE10D5AB2A}"/>
+              </a:ext>
+            </a:extLst>
+          </p:cNvPr>
+          <p:cNvPicPr>
+            <a:picLocks noChangeAspect="1"/>
+          </p:cNvPicPr>
+          <p:nvPr/>
+        </p:nvPicPr>
+        <p:blipFill>
+          <a:blip r:embed="rId8">
+            <a:extLst>
+              <a:ext uri="{28A0092B-C50C-407E-A947-70E740481C1C}">
+                <a14:useLocalDpi xmlns:a14="http://schemas.microsoft.com/office/drawing/2010/main" val="0"/>
+              </a:ext>
+            </a:extLst>
+          </a:blip>
+          <a:stretch>
+            <a:fillRect/>
+          </a:stretch>
+        </p:blipFill>
+        <p:spPr>
+          <a:xfrm>
+            <a:off x="39501447" y="504354"/>
+            <a:ext cx="3526713" cy="3526713"/>
+          </a:xfrm>
+          <a:prstGeom prst="rect">
+            <a:avLst/>
+          </a:prstGeom>
+        </p:spPr>
+      </p:pic>
+    </p:spTree>
+    <p:extLst>
+      <p:ext uri="{BB962C8B-B14F-4D97-AF65-F5344CB8AC3E}">
+        <p14:creationId xmlns:p14="http://schemas.microsoft.com/office/powerpoint/2010/main" val="2163226375"/>
+      </p:ext>
+    </p:extLst>
+  </p:cSld>
+  <p:clrMapOvr>
+    <a:masterClrMapping/>
+  </p:clrMapOvr>
+</p:sld>
+</file>
+
+<file path=ppt/slides/slide2.xml><?xml version="1.0" encoding="utf-8"?>
+<p:sld xmlns:a="http://schemas.openxmlformats.org/drawingml/2006/main" xmlns:r="http://schemas.openxmlformats.org/officeDocument/2006/relationships" xmlns:p="http://schemas.openxmlformats.org/presentationml/2006/main">
+  <p:cSld>
+    <p:spTree>
+      <p:nvGrpSpPr>
+        <p:cNvPr id="1" name=""/>
+        <p:cNvGrpSpPr/>
+        <p:nvPr/>
+      </p:nvGrpSpPr>
+      <p:grpSpPr>
+        <a:xfrm>
+          <a:off x="0" y="0"/>
+          <a:ext cx="0" cy="0"/>
+          <a:chOff x="0" y="0"/>
+          <a:chExt cx="0" cy="0"/>
+        </a:xfrm>
+      </p:grpSpPr>
+    </p:spTree>
+    <p:extLst>
+      <p:ext uri="{BB962C8B-B14F-4D97-AF65-F5344CB8AC3E}">
+        <p14:creationId xmlns:p14="http://schemas.microsoft.com/office/powerpoint/2010/main" val="4157353855"/>
+      </p:ext>
+    </p:extLst>
+  </p:cSld>
+  <p:clrMapOvr>
+    <a:masterClrMapping/>
+  </p:clrMapOvr>
+</p:sld>
+</file>
+
+<file path=ppt/slides/slide3.xml><?xml version="1.0" encoding="utf-8"?>
+<p:sld xmlns:a="http://schemas.openxmlformats.org/drawingml/2006/main" xmlns:r="http://schemas.openxmlformats.org/officeDocument/2006/relationships" xmlns:p="http://schemas.openxmlformats.org/presentationml/2006/main">
+  <p:cSld>
+    <p:spTree>
+      <p:nvGrpSpPr>
+        <p:cNvPr id="1" name=""/>
+        <p:cNvGrpSpPr/>
+        <p:nvPr/>
+      </p:nvGrpSpPr>
+      <p:grpSpPr>
+        <a:xfrm>
+          <a:off x="0" y="0"/>
+          <a:ext cx="0" cy="0"/>
+          <a:chOff x="0" y="0"/>
+          <a:chExt cx="0" cy="0"/>
+        </a:xfrm>
+      </p:grpSpPr>
+      <p:sp>
+        <p:nvSpPr>
           <p:cNvPr id="4" name="Rectangle 3">
             <a:extLst>
               <a:ext uri="{FF2B5EF4-FFF2-40B4-BE49-F238E27FC236}">
@@ -4299,7 +6181,7 @@
 </p:sld>
 </file>
 
-<file path=ppt/slides/slide2.xml><?xml version="1.0" encoding="utf-8"?>
+<file path=ppt/slides/slide4.xml><?xml version="1.0" encoding="utf-8"?>
 <p:sld xmlns:a="http://schemas.openxmlformats.org/drawingml/2006/main" xmlns:r="http://schemas.openxmlformats.org/officeDocument/2006/relationships" xmlns:p="http://schemas.openxmlformats.org/presentationml/2006/main">
   <p:cSld>
     <p:spTree>
@@ -4567,7 +6449,7 @@
                   <a:tabLst/>
                 </a:pPr>
                 <a:r>
-                  <a:rPr kumimoji="0" lang="en-US" altLang="en-US" sz="5600" b="0" i="0" u="none" strike="noStrike" cap="none" normalizeH="0" baseline="0">
+                  <a:rPr kumimoji="0" lang="en-US" altLang="en-US" sz="5600" b="0" i="0" u="none" strike="noStrike" cap="none" normalizeH="0" baseline="0" dirty="0">
                     <a:ln>
                       <a:noFill/>
                     </a:ln>
@@ -4579,7 +6461,7 @@
                   </a:rPr>
                   <a:t>Samuel Teplov				Gaurav Deshpande				Alon Peer</a:t>
                 </a:r>
-                <a:endParaRPr kumimoji="0" lang="en-US" altLang="en-US" sz="1800" b="0" i="0" u="none" strike="noStrike" cap="none" normalizeH="0" baseline="0">
+                <a:endParaRPr kumimoji="0" lang="en-US" altLang="en-US" sz="1800" b="0" i="0" u="none" strike="noStrike" cap="none" normalizeH="0" baseline="0" dirty="0">
                   <a:ln>
                     <a:noFill/>
                   </a:ln>
@@ -4673,7 +6555,7 @@
                   <a:tabLst/>
                 </a:pPr>
                 <a:r>
-                  <a:rPr kumimoji="0" lang="en-US" altLang="en-US" sz="9700" b="0" i="0" u="none" strike="noStrike" cap="none" normalizeH="0" baseline="0">
+                  <a:rPr kumimoji="0" lang="en-US" altLang="en-US" sz="9700" b="0" i="0" u="none" strike="noStrike" cap="none" normalizeH="0" baseline="0" dirty="0">
                     <a:ln>
                       <a:noFill/>
                     </a:ln>
@@ -4685,7 +6567,7 @@
                   </a:rPr>
                   <a:t>A Systematic Approach to Analyzing Syndication of Viral News Stories</a:t>
                 </a:r>
-                <a:endParaRPr kumimoji="0" lang="en-US" altLang="en-US" sz="1800" b="0" i="0" u="none" strike="noStrike" cap="none" normalizeH="0" baseline="0">
+                <a:endParaRPr kumimoji="0" lang="en-US" altLang="en-US" sz="1800" b="0" i="0" u="none" strike="noStrike" cap="none" normalizeH="0" baseline="0" dirty="0">
                   <a:ln>
                     <a:noFill/>
                   </a:ln>
@@ -5037,7 +6919,7 @@
         </p:nvGrpSpPr>
         <p:grpSpPr bwMode="auto">
           <a:xfrm>
-            <a:off x="160338" y="9504363"/>
+            <a:off x="103188" y="8072437"/>
             <a:ext cx="8407400" cy="7340600"/>
             <a:chOff x="108973620" y="109117180"/>
             <a:chExt cx="2423160" cy="2136039"/>
@@ -8021,4 +9903,299 @@
     </a:ext>
   </a:extLst>
 </a:theme>
+</file>
+
+<file path=ppt/theme/theme2.xml><?xml version="1.0" encoding="utf-8"?>
+<a:theme xmlns:a="http://schemas.openxmlformats.org/drawingml/2006/main" name="Office Theme">
+  <a:themeElements>
+    <a:clrScheme name="Office">
+      <a:dk1>
+        <a:sysClr val="windowText" lastClr="000000"/>
+      </a:dk1>
+      <a:lt1>
+        <a:sysClr val="window" lastClr="FFFFFF"/>
+      </a:lt1>
+      <a:dk2>
+        <a:srgbClr val="44546A"/>
+      </a:dk2>
+      <a:lt2>
+        <a:srgbClr val="E7E6E6"/>
+      </a:lt2>
+      <a:accent1>
+        <a:srgbClr val="4472C4"/>
+      </a:accent1>
+      <a:accent2>
+        <a:srgbClr val="ED7D31"/>
+      </a:accent2>
+      <a:accent3>
+        <a:srgbClr val="A5A5A5"/>
+      </a:accent3>
+      <a:accent4>
+        <a:srgbClr val="FFC000"/>
+      </a:accent4>
+      <a:accent5>
+        <a:srgbClr val="5B9BD5"/>
+      </a:accent5>
+      <a:accent6>
+        <a:srgbClr val="70AD47"/>
+      </a:accent6>
+      <a:hlink>
+        <a:srgbClr val="0563C1"/>
+      </a:hlink>
+      <a:folHlink>
+        <a:srgbClr val="954F72"/>
+      </a:folHlink>
+    </a:clrScheme>
+    <a:fontScheme name="Office">
+      <a:majorFont>
+        <a:latin typeface="Calibri Light" panose="020F0302020204030204"/>
+        <a:ea typeface=""/>
+        <a:cs typeface=""/>
+        <a:font script="Jpan" typeface="游ゴシック Light"/>
+        <a:font script="Hang" typeface="맑은 고딕"/>
+        <a:font script="Hans" typeface="等线 Light"/>
+        <a:font script="Hant" typeface="新細明體"/>
+        <a:font script="Arab" typeface="Times New Roman"/>
+        <a:font script="Hebr" typeface="Times New Roman"/>
+        <a:font script="Thai" typeface="Angsana New"/>
+        <a:font script="Ethi" typeface="Nyala"/>
+        <a:font script="Beng" typeface="Vrinda"/>
+        <a:font script="Gujr" typeface="Shruti"/>
+        <a:font script="Khmr" typeface="MoolBoran"/>
+        <a:font script="Knda" typeface="Tunga"/>
+        <a:font script="Guru" typeface="Raavi"/>
+        <a:font script="Cans" typeface="Euphemia"/>
+        <a:font script="Cher" typeface="Plantagenet Cherokee"/>
+        <a:font script="Yiii" typeface="Microsoft Yi Baiti"/>
+        <a:font script="Tibt" typeface="Microsoft Himalaya"/>
+        <a:font script="Thaa" typeface="MV Boli"/>
+        <a:font script="Deva" typeface="Mangal"/>
+        <a:font script="Telu" typeface="Gautami"/>
+        <a:font script="Taml" typeface="Latha"/>
+        <a:font script="Syrc" typeface="Estrangelo Edessa"/>
+        <a:font script="Orya" typeface="Kalinga"/>
+        <a:font script="Mlym" typeface="Kartika"/>
+        <a:font script="Laoo" typeface="DokChampa"/>
+        <a:font script="Sinh" typeface="Iskoola Pota"/>
+        <a:font script="Mong" typeface="Mongolian Baiti"/>
+        <a:font script="Viet" typeface="Times New Roman"/>
+        <a:font script="Uigh" typeface="Microsoft Uighur"/>
+        <a:font script="Geor" typeface="Sylfaen"/>
+        <a:font script="Armn" typeface="Arial"/>
+        <a:font script="Bugi" typeface="Leelawadee UI"/>
+        <a:font script="Bopo" typeface="Microsoft JhengHei"/>
+        <a:font script="Java" typeface="Javanese Text"/>
+        <a:font script="Lisu" typeface="Segoe UI"/>
+        <a:font script="Mymr" typeface="Myanmar Text"/>
+        <a:font script="Nkoo" typeface="Ebrima"/>
+        <a:font script="Olck" typeface="Nirmala UI"/>
+        <a:font script="Osma" typeface="Ebrima"/>
+        <a:font script="Phag" typeface="Phagspa"/>
+        <a:font script="Syrn" typeface="Estrangelo Edessa"/>
+        <a:font script="Syrj" typeface="Estrangelo Edessa"/>
+        <a:font script="Syre" typeface="Estrangelo Edessa"/>
+        <a:font script="Sora" typeface="Nirmala UI"/>
+        <a:font script="Tale" typeface="Microsoft Tai Le"/>
+        <a:font script="Talu" typeface="Microsoft New Tai Lue"/>
+        <a:font script="Tfng" typeface="Ebrima"/>
+      </a:majorFont>
+      <a:minorFont>
+        <a:latin typeface="Calibri" panose="020F0502020204030204"/>
+        <a:ea typeface=""/>
+        <a:cs typeface=""/>
+        <a:font script="Jpan" typeface="游ゴシック"/>
+        <a:font script="Hang" typeface="맑은 고딕"/>
+        <a:font script="Hans" typeface="等线"/>
+        <a:font script="Hant" typeface="新細明體"/>
+        <a:font script="Arab" typeface="Arial"/>
+        <a:font script="Hebr" typeface="Arial"/>
+        <a:font script="Thai" typeface="Cordia New"/>
+        <a:font script="Ethi" typeface="Nyala"/>
+        <a:font script="Beng" typeface="Vrinda"/>
+        <a:font script="Gujr" typeface="Shruti"/>
+        <a:font script="Khmr" typeface="DaunPenh"/>
+        <a:font script="Knda" typeface="Tunga"/>
+        <a:font script="Guru" typeface="Raavi"/>
+        <a:font script="Cans" typeface="Euphemia"/>
+        <a:font script="Cher" typeface="Plantagenet Cherokee"/>
+        <a:font script="Yiii" typeface="Microsoft Yi Baiti"/>
+        <a:font script="Tibt" typeface="Microsoft Himalaya"/>
+        <a:font script="Thaa" typeface="MV Boli"/>
+        <a:font script="Deva" typeface="Mangal"/>
+        <a:font script="Telu" typeface="Gautami"/>
+        <a:font script="Taml" typeface="Latha"/>
+        <a:font script="Syrc" typeface="Estrangelo Edessa"/>
+        <a:font script="Orya" typeface="Kalinga"/>
+        <a:font script="Mlym" typeface="Kartika"/>
+        <a:font script="Laoo" typeface="DokChampa"/>
+        <a:font script="Sinh" typeface="Iskoola Pota"/>
+        <a:font script="Mong" typeface="Mongolian Baiti"/>
+        <a:font script="Viet" typeface="Arial"/>
+        <a:font script="Uigh" typeface="Microsoft Uighur"/>
+        <a:font script="Geor" typeface="Sylfaen"/>
+        <a:font script="Armn" typeface="Arial"/>
+        <a:font script="Bugi" typeface="Leelawadee UI"/>
+        <a:font script="Bopo" typeface="Microsoft JhengHei"/>
+        <a:font script="Java" typeface="Javanese Text"/>
+        <a:font script="Lisu" typeface="Segoe UI"/>
+        <a:font script="Mymr" typeface="Myanmar Text"/>
+        <a:font script="Nkoo" typeface="Ebrima"/>
+        <a:font script="Olck" typeface="Nirmala UI"/>
+        <a:font script="Osma" typeface="Ebrima"/>
+        <a:font script="Phag" typeface="Phagspa"/>
+        <a:font script="Syrn" typeface="Estrangelo Edessa"/>
+        <a:font script="Syrj" typeface="Estrangelo Edessa"/>
+        <a:font script="Syre" typeface="Estrangelo Edessa"/>
+        <a:font script="Sora" typeface="Nirmala UI"/>
+        <a:font script="Tale" typeface="Microsoft Tai Le"/>
+        <a:font script="Talu" typeface="Microsoft New Tai Lue"/>
+        <a:font script="Tfng" typeface="Ebrima"/>
+      </a:minorFont>
+    </a:fontScheme>
+    <a:fmtScheme name="Office">
+      <a:fillStyleLst>
+        <a:solidFill>
+          <a:schemeClr val="phClr"/>
+        </a:solidFill>
+        <a:gradFill rotWithShape="1">
+          <a:gsLst>
+            <a:gs pos="0">
+              <a:schemeClr val="phClr">
+                <a:lumMod val="110000"/>
+                <a:satMod val="105000"/>
+                <a:tint val="67000"/>
+              </a:schemeClr>
+            </a:gs>
+            <a:gs pos="50000">
+              <a:schemeClr val="phClr">
+                <a:lumMod val="105000"/>
+                <a:satMod val="103000"/>
+                <a:tint val="73000"/>
+              </a:schemeClr>
+            </a:gs>
+            <a:gs pos="100000">
+              <a:schemeClr val="phClr">
+                <a:lumMod val="105000"/>
+                <a:satMod val="109000"/>
+                <a:tint val="81000"/>
+              </a:schemeClr>
+            </a:gs>
+          </a:gsLst>
+          <a:lin ang="5400000" scaled="0"/>
+        </a:gradFill>
+        <a:gradFill rotWithShape="1">
+          <a:gsLst>
+            <a:gs pos="0">
+              <a:schemeClr val="phClr">
+                <a:satMod val="103000"/>
+                <a:lumMod val="102000"/>
+                <a:tint val="94000"/>
+              </a:schemeClr>
+            </a:gs>
+            <a:gs pos="50000">
+              <a:schemeClr val="phClr">
+                <a:satMod val="110000"/>
+                <a:lumMod val="100000"/>
+                <a:shade val="100000"/>
+              </a:schemeClr>
+            </a:gs>
+            <a:gs pos="100000">
+              <a:schemeClr val="phClr">
+                <a:lumMod val="99000"/>
+                <a:satMod val="120000"/>
+                <a:shade val="78000"/>
+              </a:schemeClr>
+            </a:gs>
+          </a:gsLst>
+          <a:lin ang="5400000" scaled="0"/>
+        </a:gradFill>
+      </a:fillStyleLst>
+      <a:lnStyleLst>
+        <a:ln w="6350" cap="flat" cmpd="sng" algn="ctr">
+          <a:solidFill>
+            <a:schemeClr val="phClr"/>
+          </a:solidFill>
+          <a:prstDash val="solid"/>
+          <a:miter lim="800000"/>
+        </a:ln>
+        <a:ln w="12700" cap="flat" cmpd="sng" algn="ctr">
+          <a:solidFill>
+            <a:schemeClr val="phClr"/>
+          </a:solidFill>
+          <a:prstDash val="solid"/>
+          <a:miter lim="800000"/>
+        </a:ln>
+        <a:ln w="19050" cap="flat" cmpd="sng" algn="ctr">
+          <a:solidFill>
+            <a:schemeClr val="phClr"/>
+          </a:solidFill>
+          <a:prstDash val="solid"/>
+          <a:miter lim="800000"/>
+        </a:ln>
+      </a:lnStyleLst>
+      <a:effectStyleLst>
+        <a:effectStyle>
+          <a:effectLst/>
+        </a:effectStyle>
+        <a:effectStyle>
+          <a:effectLst/>
+        </a:effectStyle>
+        <a:effectStyle>
+          <a:effectLst>
+            <a:outerShdw blurRad="57150" dist="19050" dir="5400000" algn="ctr" rotWithShape="0">
+              <a:srgbClr val="000000">
+                <a:alpha val="63000"/>
+              </a:srgbClr>
+            </a:outerShdw>
+          </a:effectLst>
+        </a:effectStyle>
+      </a:effectStyleLst>
+      <a:bgFillStyleLst>
+        <a:solidFill>
+          <a:schemeClr val="phClr"/>
+        </a:solidFill>
+        <a:solidFill>
+          <a:schemeClr val="phClr">
+            <a:tint val="95000"/>
+            <a:satMod val="170000"/>
+          </a:schemeClr>
+        </a:solidFill>
+        <a:gradFill rotWithShape="1">
+          <a:gsLst>
+            <a:gs pos="0">
+              <a:schemeClr val="phClr">
+                <a:tint val="93000"/>
+                <a:satMod val="150000"/>
+                <a:shade val="98000"/>
+                <a:lumMod val="102000"/>
+              </a:schemeClr>
+            </a:gs>
+            <a:gs pos="50000">
+              <a:schemeClr val="phClr">
+                <a:tint val="98000"/>
+                <a:satMod val="130000"/>
+                <a:shade val="90000"/>
+                <a:lumMod val="103000"/>
+              </a:schemeClr>
+            </a:gs>
+            <a:gs pos="100000">
+              <a:schemeClr val="phClr">
+                <a:shade val="63000"/>
+                <a:satMod val="120000"/>
+              </a:schemeClr>
+            </a:gs>
+          </a:gsLst>
+          <a:lin ang="5400000" scaled="0"/>
+        </a:gradFill>
+      </a:bgFillStyleLst>
+    </a:fmtScheme>
+  </a:themeElements>
+  <a:objectDefaults/>
+  <a:extraClrSchemeLst/>
+  <a:extLst>
+    <a:ext uri="{05A4C25C-085E-4340-85A3-A5531E510DB2}">
+      <thm15:themeFamily xmlns:thm15="http://schemas.microsoft.com/office/thememl/2012/main" name="Office Theme" id="{62F939B6-93AF-4DB8-9C6B-D6C7DFDC589F}" vid="{4A3C46E8-61CC-4603-A589-7422A47A8E4A}"/>
+    </a:ext>
+  </a:extLst>
+</a:theme>
 </file>
</xml_diff>

<commit_message>
updated text in ppt
</commit_message>
<xml_diff>
--- a/poster/Poster.pptx
+++ b/poster/Poster.pptx
@@ -200,7 +200,7 @@
           <a:p>
             <a:fld id="{3D4F2AB0-DD4A-184B-9DCF-430CD49425A1}" type="datetimeFigureOut">
               <a:rPr lang="en-US" smtClean="0"/>
-              <a:t>12/1/19</a:t>
+              <a:t>12/2/19</a:t>
             </a:fld>
             <a:endParaRPr lang="en-US"/>
           </a:p>
@@ -614,7 +614,7 @@
           <a:p>
             <a:fld id="{5C5B84BE-8907-4088-A091-8BB02B06D018}" type="datetimeFigureOut">
               <a:rPr lang="en-US" smtClean="0"/>
-              <a:t>12/1/19</a:t>
+              <a:t>12/2/19</a:t>
             </a:fld>
             <a:endParaRPr lang="en-US"/>
           </a:p>
@@ -812,7 +812,7 @@
           <a:p>
             <a:fld id="{5C5B84BE-8907-4088-A091-8BB02B06D018}" type="datetimeFigureOut">
               <a:rPr lang="en-US" smtClean="0"/>
-              <a:t>12/1/19</a:t>
+              <a:t>12/2/19</a:t>
             </a:fld>
             <a:endParaRPr lang="en-US"/>
           </a:p>
@@ -1020,7 +1020,7 @@
           <a:p>
             <a:fld id="{5C5B84BE-8907-4088-A091-8BB02B06D018}" type="datetimeFigureOut">
               <a:rPr lang="en-US" smtClean="0"/>
-              <a:t>12/1/19</a:t>
+              <a:t>12/2/19</a:t>
             </a:fld>
             <a:endParaRPr lang="en-US"/>
           </a:p>
@@ -1218,7 +1218,7 @@
           <a:p>
             <a:fld id="{5C5B84BE-8907-4088-A091-8BB02B06D018}" type="datetimeFigureOut">
               <a:rPr lang="en-US" smtClean="0"/>
-              <a:t>12/1/19</a:t>
+              <a:t>12/2/19</a:t>
             </a:fld>
             <a:endParaRPr lang="en-US"/>
           </a:p>
@@ -1493,7 +1493,7 @@
           <a:p>
             <a:fld id="{5C5B84BE-8907-4088-A091-8BB02B06D018}" type="datetimeFigureOut">
               <a:rPr lang="en-US" smtClean="0"/>
-              <a:t>12/1/19</a:t>
+              <a:t>12/2/19</a:t>
             </a:fld>
             <a:endParaRPr lang="en-US"/>
           </a:p>
@@ -1758,7 +1758,7 @@
           <a:p>
             <a:fld id="{5C5B84BE-8907-4088-A091-8BB02B06D018}" type="datetimeFigureOut">
               <a:rPr lang="en-US" smtClean="0"/>
-              <a:t>12/1/19</a:t>
+              <a:t>12/2/19</a:t>
             </a:fld>
             <a:endParaRPr lang="en-US"/>
           </a:p>
@@ -2170,7 +2170,7 @@
           <a:p>
             <a:fld id="{5C5B84BE-8907-4088-A091-8BB02B06D018}" type="datetimeFigureOut">
               <a:rPr lang="en-US" smtClean="0"/>
-              <a:t>12/1/19</a:t>
+              <a:t>12/2/19</a:t>
             </a:fld>
             <a:endParaRPr lang="en-US"/>
           </a:p>
@@ -2311,7 +2311,7 @@
           <a:p>
             <a:fld id="{5C5B84BE-8907-4088-A091-8BB02B06D018}" type="datetimeFigureOut">
               <a:rPr lang="en-US" smtClean="0"/>
-              <a:t>12/1/19</a:t>
+              <a:t>12/2/19</a:t>
             </a:fld>
             <a:endParaRPr lang="en-US"/>
           </a:p>
@@ -2424,7 +2424,7 @@
           <a:p>
             <a:fld id="{5C5B84BE-8907-4088-A091-8BB02B06D018}" type="datetimeFigureOut">
               <a:rPr lang="en-US" smtClean="0"/>
-              <a:t>12/1/19</a:t>
+              <a:t>12/2/19</a:t>
             </a:fld>
             <a:endParaRPr lang="en-US"/>
           </a:p>
@@ -2735,7 +2735,7 @@
           <a:p>
             <a:fld id="{5C5B84BE-8907-4088-A091-8BB02B06D018}" type="datetimeFigureOut">
               <a:rPr lang="en-US" smtClean="0"/>
-              <a:t>12/1/19</a:t>
+              <a:t>12/2/19</a:t>
             </a:fld>
             <a:endParaRPr lang="en-US"/>
           </a:p>
@@ -3023,7 +3023,7 @@
           <a:p>
             <a:fld id="{5C5B84BE-8907-4088-A091-8BB02B06D018}" type="datetimeFigureOut">
               <a:rPr lang="en-US" smtClean="0"/>
-              <a:t>12/1/19</a:t>
+              <a:t>12/2/19</a:t>
             </a:fld>
             <a:endParaRPr lang="en-US"/>
           </a:p>
@@ -3264,7 +3264,7 @@
           <a:p>
             <a:fld id="{5C5B84BE-8907-4088-A091-8BB02B06D018}" type="datetimeFigureOut">
               <a:rPr lang="en-US" smtClean="0"/>
-              <a:t>12/1/19</a:t>
+              <a:t>12/2/19</a:t>
             </a:fld>
             <a:endParaRPr lang="en-US"/>
           </a:p>
@@ -3979,7 +3979,7 @@
         <p:spPr>
           <a:xfrm>
             <a:off x="457200" y="6260347"/>
-            <a:ext cx="18026743" cy="7417415"/>
+            <a:ext cx="18026743" cy="3170099"/>
           </a:xfrm>
           <a:prstGeom prst="rect">
             <a:avLst/>
@@ -4004,8 +4004,8 @@
               <a:buChar char="•"/>
             </a:pPr>
             <a:r>
-              <a:rPr lang="en-US" sz="4400" dirty="0"/>
-              <a:t>Misinformation has become a normal occurrence in our interconnected society with nation states, extremist organizations, and fringe web communities all contributing to the current state of disarray.</a:t>
+              <a:rPr lang="en-US" sz="4000" dirty="0"/>
+              <a:t>Misinformation has become a normal occurrence in our interconnected society</a:t>
             </a:r>
           </a:p>
           <a:p>
@@ -4014,20 +4014,19 @@
               <a:buChar char="•"/>
             </a:pPr>
             <a:r>
-              <a:rPr lang="en-US" sz="4400" dirty="0"/>
-              <a:t>Most research on fake news detection thus far has focused on detection after dissemination, which proves to be problematic since some people will still be affected.</a:t>
+              <a:rPr lang="en-US" sz="4000" dirty="0"/>
+              <a:t>Media outlets further exacerbate this problem by blindly syndicating articles</a:t>
             </a:r>
           </a:p>
           <a:p>
-            <a:pPr marL="685800" indent="-685800">
+            <a:pPr marL="685800" indent="-685800" fontAlgn="base">
               <a:buFont typeface="Arial" panose="020B0604020202020204" pitchFamily="34" charset="0"/>
               <a:buChar char="•"/>
             </a:pPr>
             <a:r>
-              <a:rPr lang="en-US" sz="4400" dirty="0"/>
-              <a:t>Some researchers have suggested that future work in this field should focus on early fake news detection so that before a news story becomes viral, it can already be flagged as possible misinformation or as unverified.</a:t>
+              <a:rPr lang="en-US" sz="4000" dirty="0"/>
+              <a:t>Tracing the propagation path of syndicated articles is a very tedious task</a:t>
             </a:r>
-            <a:endParaRPr lang="en-US" sz="28700" dirty="0"/>
           </a:p>
         </p:txBody>
       </p:sp>
@@ -4046,7 +4045,7 @@
         <p:spPr>
           <a:xfrm>
             <a:off x="457199" y="13632242"/>
-            <a:ext cx="18026743" cy="7417415"/>
+            <a:ext cx="18026743" cy="2554545"/>
           </a:xfrm>
           <a:prstGeom prst="rect">
             <a:avLst/>
@@ -4071,8 +4070,45 @@
               <a:buChar char="•"/>
             </a:pPr>
             <a:r>
-              <a:rPr lang="en-US" sz="4400" dirty="0"/>
-              <a:t>For progress to be made on classifying misinformation prior to becoming viral , a deeper understanding of news syndication and propagation is required.</a:t>
+              <a:rPr lang="en-US" sz="4000" dirty="0"/>
+              <a:t>To create a system which automatically identifies related articles, clusters them together, and then performs analysis on the associated metadata.</a:t>
+            </a:r>
+            <a:endParaRPr lang="en-US" sz="8000" dirty="0"/>
+          </a:p>
+        </p:txBody>
+      </p:sp>
+      <p:sp>
+        <p:nvSpPr>
+          <p:cNvPr id="12" name="TextBox 11">
+            <a:extLst>
+              <a:ext uri="{FF2B5EF4-FFF2-40B4-BE49-F238E27FC236}">
+                <a16:creationId xmlns:a16="http://schemas.microsoft.com/office/drawing/2014/main" id="{A893CD7C-C670-B645-AE78-1698553DCD12}"/>
+              </a:ext>
+            </a:extLst>
+          </p:cNvPr>
+          <p:cNvSpPr txBox="1"/>
+          <p:nvPr/>
+        </p:nvSpPr>
+        <p:spPr>
+          <a:xfrm>
+            <a:off x="457198" y="27722640"/>
+            <a:ext cx="18026743" cy="4278094"/>
+          </a:xfrm>
+          <a:prstGeom prst="rect">
+            <a:avLst/>
+          </a:prstGeom>
+          <a:noFill/>
+        </p:spPr>
+        <p:txBody>
+          <a:bodyPr wrap="square" rtlCol="0">
+            <a:spAutoFit/>
+          </a:bodyPr>
+          <a:lstStyle/>
+          <a:p>
+            <a:pPr algn="ctr"/>
+            <a:r>
+              <a:rPr lang="en-US" sz="8000" dirty="0"/>
+              <a:t>Future Work</a:t>
             </a:r>
           </a:p>
           <a:p>
@@ -4081,8 +4117,8 @@
               <a:buChar char="•"/>
             </a:pPr>
             <a:r>
-              <a:rPr lang="en-US" sz="4400" dirty="0"/>
-              <a:t>In our research we present novel ways of defining different types of news propagation, as well as illustrating patterns that arise from the way in which news articles propagate.</a:t>
+              <a:rPr lang="en-US" sz="4800" dirty="0"/>
+              <a:t>Create a fully automated process to analyze propagation paths of syndicated articles and identify articles’ origin</a:t>
             </a:r>
           </a:p>
           <a:p>
@@ -4091,125 +4127,8 @@
               <a:buChar char="•"/>
             </a:pPr>
             <a:r>
-              <a:rPr lang="en-US" sz="4400" dirty="0"/>
-              <a:t>Our goal is to lay the groundwork and provide the needed background information in order to enable the early detection and classification of misinformation.</a:t>
-            </a:r>
-          </a:p>
-        </p:txBody>
-      </p:sp>
-      <p:sp>
-        <p:nvSpPr>
-          <p:cNvPr id="11" name="TextBox 10">
-            <a:extLst>
-              <a:ext uri="{FF2B5EF4-FFF2-40B4-BE49-F238E27FC236}">
-                <a16:creationId xmlns:a16="http://schemas.microsoft.com/office/drawing/2014/main" id="{D3317FAB-8872-6341-AF4D-72549947BEC3}"/>
-              </a:ext>
-            </a:extLst>
-          </p:cNvPr>
-          <p:cNvSpPr txBox="1"/>
-          <p:nvPr/>
-        </p:nvSpPr>
-        <p:spPr>
-          <a:xfrm>
-            <a:off x="457198" y="20559875"/>
-            <a:ext cx="18026743" cy="5386090"/>
-          </a:xfrm>
-          <a:prstGeom prst="rect">
-            <a:avLst/>
-          </a:prstGeom>
-          <a:noFill/>
-        </p:spPr>
-        <p:txBody>
-          <a:bodyPr wrap="square" rtlCol="0">
-            <a:spAutoFit/>
-          </a:bodyPr>
-          <a:lstStyle/>
-          <a:p>
-            <a:pPr algn="ctr"/>
-            <a:r>
-              <a:rPr lang="en-US" sz="8000" dirty="0"/>
-              <a:t>Background</a:t>
-            </a:r>
-          </a:p>
-          <a:p>
-            <a:pPr marL="571500" indent="-571500" fontAlgn="base">
-              <a:buFont typeface="Arial" panose="020B0604020202020204" pitchFamily="34" charset="0"/>
-              <a:buChar char="•"/>
-            </a:pPr>
-            <a:r>
-              <a:rPr lang="en-US" sz="4400" dirty="0" err="1"/>
-              <a:t>Zannettou</a:t>
-            </a:r>
-            <a:r>
-              <a:rPr lang="en-US" sz="4400" dirty="0"/>
-              <a:t> et al. showed that memes originally posted by fringe web communities can eventually make their way into the mainstream media over time.</a:t>
-            </a:r>
-          </a:p>
-          <a:p>
-            <a:pPr marL="571500" indent="-571500">
-              <a:buFont typeface="Arial" panose="020B0604020202020204" pitchFamily="34" charset="0"/>
-              <a:buChar char="•"/>
-            </a:pPr>
-            <a:r>
-              <a:rPr lang="en-US" sz="4400" dirty="0"/>
-              <a:t>Wang et al. analyzed the propagation of news articles in Chinese media and categorized various features associated with the way news spreads , as well as compared online news propagation to the spread of an epidemic.</a:t>
-            </a:r>
-            <a:endParaRPr lang="en-US" sz="8800" dirty="0"/>
-          </a:p>
-        </p:txBody>
-      </p:sp>
-      <p:sp>
-        <p:nvSpPr>
-          <p:cNvPr id="12" name="TextBox 11">
-            <a:extLst>
-              <a:ext uri="{FF2B5EF4-FFF2-40B4-BE49-F238E27FC236}">
-                <a16:creationId xmlns:a16="http://schemas.microsoft.com/office/drawing/2014/main" id="{A893CD7C-C670-B645-AE78-1698553DCD12}"/>
-              </a:ext>
-            </a:extLst>
-          </p:cNvPr>
-          <p:cNvSpPr txBox="1"/>
-          <p:nvPr/>
-        </p:nvSpPr>
-        <p:spPr>
-          <a:xfrm>
-            <a:off x="457198" y="25945965"/>
-            <a:ext cx="18026743" cy="4031873"/>
-          </a:xfrm>
-          <a:prstGeom prst="rect">
-            <a:avLst/>
-          </a:prstGeom>
-          <a:noFill/>
-        </p:spPr>
-        <p:txBody>
-          <a:bodyPr wrap="square" rtlCol="0">
-            <a:spAutoFit/>
-          </a:bodyPr>
-          <a:lstStyle/>
-          <a:p>
-            <a:pPr algn="ctr"/>
-            <a:r>
-              <a:rPr lang="en-US" sz="8000" dirty="0"/>
-              <a:t>Future Work</a:t>
-            </a:r>
-          </a:p>
-          <a:p>
-            <a:pPr marL="571500" indent="-571500" fontAlgn="base">
-              <a:buFont typeface="Arial" panose="020B0604020202020204" pitchFamily="34" charset="0"/>
-              <a:buChar char="•"/>
-            </a:pPr>
-            <a:r>
-              <a:rPr lang="en-US" sz="4400" dirty="0"/>
-              <a:t>Create an automatic process to classify the different types of propagation that are occurring using some of the heuristics that we have identified.</a:t>
-            </a:r>
-          </a:p>
-          <a:p>
-            <a:pPr marL="571500" indent="-571500" fontAlgn="base">
-              <a:buFont typeface="Arial" panose="020B0604020202020204" pitchFamily="34" charset="0"/>
-              <a:buChar char="•"/>
-            </a:pPr>
-            <a:r>
-              <a:rPr lang="en-US" sz="4400" dirty="0"/>
-              <a:t>Create a system which can identify an article that has not been verified as correct and could possibly be misinformation. </a:t>
+              <a:rPr lang="en-US" sz="4800" dirty="0"/>
+              <a:t>Incorporate our work into already existing fake news classification models</a:t>
             </a:r>
           </a:p>
         </p:txBody>
@@ -6273,6 +6192,236 @@
           </a:p>
         </p:txBody>
       </p:sp>
+      <p:sp>
+        <p:nvSpPr>
+          <p:cNvPr id="53" name="TextBox 52">
+            <a:extLst>
+              <a:ext uri="{FF2B5EF4-FFF2-40B4-BE49-F238E27FC236}">
+                <a16:creationId xmlns:a16="http://schemas.microsoft.com/office/drawing/2014/main" id="{928640EE-9401-8C4A-AF94-B2AC86E9F4BC}"/>
+              </a:ext>
+            </a:extLst>
+          </p:cNvPr>
+          <p:cNvSpPr txBox="1"/>
+          <p:nvPr/>
+        </p:nvSpPr>
+        <p:spPr>
+          <a:xfrm>
+            <a:off x="491455" y="20213413"/>
+            <a:ext cx="18026743" cy="6494085"/>
+          </a:xfrm>
+          <a:prstGeom prst="rect">
+            <a:avLst/>
+          </a:prstGeom>
+          <a:noFill/>
+        </p:spPr>
+        <p:txBody>
+          <a:bodyPr wrap="square" rtlCol="0">
+            <a:spAutoFit/>
+          </a:bodyPr>
+          <a:lstStyle/>
+          <a:p>
+            <a:pPr algn="ctr"/>
+            <a:r>
+              <a:rPr lang="en-US" sz="8000" dirty="0"/>
+              <a:t>Contributions</a:t>
+            </a:r>
+          </a:p>
+          <a:p>
+            <a:r>
+              <a:rPr lang="en-US" sz="4800" dirty="0"/>
+              <a:t>       Semi automatic search of related articles</a:t>
+            </a:r>
+          </a:p>
+          <a:p>
+            <a:endParaRPr lang="en-US" sz="4800" dirty="0"/>
+          </a:p>
+          <a:p>
+            <a:pPr fontAlgn="base"/>
+            <a:r>
+              <a:rPr lang="en-US" sz="4800" dirty="0"/>
+              <a:t>       Classification of related articles based on similarity score</a:t>
+            </a:r>
+          </a:p>
+          <a:p>
+            <a:pPr fontAlgn="base"/>
+            <a:endParaRPr lang="en-US" sz="4800" dirty="0"/>
+          </a:p>
+          <a:p>
+            <a:pPr fontAlgn="base"/>
+            <a:r>
+              <a:rPr lang="en-US" sz="4800" dirty="0"/>
+              <a:t>       Identification of propagation path</a:t>
+            </a:r>
+          </a:p>
+          <a:p>
+            <a:pPr fontAlgn="base"/>
+            <a:endParaRPr lang="en-US" sz="4800" dirty="0"/>
+          </a:p>
+          <a:p>
+            <a:pPr fontAlgn="base"/>
+            <a:r>
+              <a:rPr lang="en-US" sz="4800" dirty="0"/>
+              <a:t>       Analyze of various metadata features </a:t>
+            </a:r>
+          </a:p>
+        </p:txBody>
+      </p:sp>
+      <p:pic>
+        <p:nvPicPr>
+          <p:cNvPr id="13" name="Graphic 12" descr="Magnifying glass">
+            <a:extLst>
+              <a:ext uri="{FF2B5EF4-FFF2-40B4-BE49-F238E27FC236}">
+                <a16:creationId xmlns:a16="http://schemas.microsoft.com/office/drawing/2014/main" id="{1DC0FC10-1E0E-2B45-B6BB-AF545F4C2E87}"/>
+              </a:ext>
+            </a:extLst>
+          </p:cNvPr>
+          <p:cNvPicPr>
+            <a:picLocks noChangeAspect="1"/>
+          </p:cNvPicPr>
+          <p:nvPr/>
+        </p:nvPicPr>
+        <p:blipFill>
+          <a:blip r:embed="rId14">
+            <a:extLst>
+              <a:ext uri="{28A0092B-C50C-407E-A947-70E740481C1C}">
+                <a14:useLocalDpi xmlns:a14="http://schemas.microsoft.com/office/drawing/2010/main" val="0"/>
+              </a:ext>
+              <a:ext uri="{96DAC541-7B7A-43D3-8B79-37D633B846F1}">
+                <asvg:svgBlip xmlns:asvg="http://schemas.microsoft.com/office/drawing/2016/SVG/main" r:embed="rId15"/>
+              </a:ext>
+            </a:extLst>
+          </a:blip>
+          <a:stretch>
+            <a:fillRect/>
+          </a:stretch>
+        </p:blipFill>
+        <p:spPr>
+          <a:xfrm>
+            <a:off x="503356" y="21325407"/>
+            <a:ext cx="786286" cy="786286"/>
+          </a:xfrm>
+          <a:prstGeom prst="rect">
+            <a:avLst/>
+          </a:prstGeom>
+        </p:spPr>
+      </p:pic>
+      <p:pic>
+        <p:nvPicPr>
+          <p:cNvPr id="16" name="Graphic 15" descr="Flowchart">
+            <a:extLst>
+              <a:ext uri="{FF2B5EF4-FFF2-40B4-BE49-F238E27FC236}">
+                <a16:creationId xmlns:a16="http://schemas.microsoft.com/office/drawing/2014/main" id="{1B68A216-3D46-9B45-9DDE-75BFFAD66803}"/>
+              </a:ext>
+            </a:extLst>
+          </p:cNvPr>
+          <p:cNvPicPr>
+            <a:picLocks noChangeAspect="1"/>
+          </p:cNvPicPr>
+          <p:nvPr/>
+        </p:nvPicPr>
+        <p:blipFill>
+          <a:blip r:embed="rId16">
+            <a:extLst>
+              <a:ext uri="{28A0092B-C50C-407E-A947-70E740481C1C}">
+                <a14:useLocalDpi xmlns:a14="http://schemas.microsoft.com/office/drawing/2010/main" val="0"/>
+              </a:ext>
+              <a:ext uri="{96DAC541-7B7A-43D3-8B79-37D633B846F1}">
+                <asvg:svgBlip xmlns:asvg="http://schemas.microsoft.com/office/drawing/2016/SVG/main" r:embed="rId17"/>
+              </a:ext>
+            </a:extLst>
+          </a:blip>
+          <a:stretch>
+            <a:fillRect/>
+          </a:stretch>
+        </p:blipFill>
+        <p:spPr>
+          <a:xfrm>
+            <a:off x="439299" y="22726922"/>
+            <a:ext cx="914400" cy="914400"/>
+          </a:xfrm>
+          <a:prstGeom prst="rect">
+            <a:avLst/>
+          </a:prstGeom>
+        </p:spPr>
+      </p:pic>
+      <p:pic>
+        <p:nvPicPr>
+          <p:cNvPr id="18" name="Graphic 17" descr="Statistics">
+            <a:extLst>
+              <a:ext uri="{FF2B5EF4-FFF2-40B4-BE49-F238E27FC236}">
+                <a16:creationId xmlns:a16="http://schemas.microsoft.com/office/drawing/2014/main" id="{0EE8F240-EB4B-BA43-9021-56DCF47B0BFF}"/>
+              </a:ext>
+            </a:extLst>
+          </p:cNvPr>
+          <p:cNvPicPr>
+            <a:picLocks noChangeAspect="1"/>
+          </p:cNvPicPr>
+          <p:nvPr/>
+        </p:nvPicPr>
+        <p:blipFill>
+          <a:blip r:embed="rId18">
+            <a:extLst>
+              <a:ext uri="{28A0092B-C50C-407E-A947-70E740481C1C}">
+                <a14:useLocalDpi xmlns:a14="http://schemas.microsoft.com/office/drawing/2010/main" val="0"/>
+              </a:ext>
+              <a:ext uri="{96DAC541-7B7A-43D3-8B79-37D633B846F1}">
+                <asvg:svgBlip xmlns:asvg="http://schemas.microsoft.com/office/drawing/2016/SVG/main" r:embed="rId19"/>
+              </a:ext>
+            </a:extLst>
+          </a:blip>
+          <a:stretch>
+            <a:fillRect/>
+          </a:stretch>
+        </p:blipFill>
+        <p:spPr>
+          <a:xfrm>
+            <a:off x="439299" y="25843469"/>
+            <a:ext cx="914400" cy="914400"/>
+          </a:xfrm>
+          <a:prstGeom prst="rect">
+            <a:avLst/>
+          </a:prstGeom>
+        </p:spPr>
+      </p:pic>
+      <p:pic>
+        <p:nvPicPr>
+          <p:cNvPr id="21" name="Graphic 20" descr="Playbook">
+            <a:extLst>
+              <a:ext uri="{FF2B5EF4-FFF2-40B4-BE49-F238E27FC236}">
+                <a16:creationId xmlns:a16="http://schemas.microsoft.com/office/drawing/2014/main" id="{165E3057-EDD8-F74E-A65D-A426FC1B819D}"/>
+              </a:ext>
+            </a:extLst>
+          </p:cNvPr>
+          <p:cNvPicPr>
+            <a:picLocks noChangeAspect="1"/>
+          </p:cNvPicPr>
+          <p:nvPr/>
+        </p:nvPicPr>
+        <p:blipFill>
+          <a:blip r:embed="rId20">
+            <a:extLst>
+              <a:ext uri="{28A0092B-C50C-407E-A947-70E740481C1C}">
+                <a14:useLocalDpi xmlns:a14="http://schemas.microsoft.com/office/drawing/2010/main" val="0"/>
+              </a:ext>
+              <a:ext uri="{96DAC541-7B7A-43D3-8B79-37D633B846F1}">
+                <asvg:svgBlip xmlns:asvg="http://schemas.microsoft.com/office/drawing/2016/SVG/main" r:embed="rId21"/>
+              </a:ext>
+            </a:extLst>
+          </a:blip>
+          <a:stretch>
+            <a:fillRect/>
+          </a:stretch>
+        </p:blipFill>
+        <p:spPr>
+          <a:xfrm>
+            <a:off x="395998" y="24256551"/>
+            <a:ext cx="914400" cy="914400"/>
+          </a:xfrm>
+          <a:prstGeom prst="rect">
+            <a:avLst/>
+          </a:prstGeom>
+        </p:spPr>
+      </p:pic>
     </p:spTree>
     <p:extLst>
       <p:ext uri="{BB962C8B-B14F-4D97-AF65-F5344CB8AC3E}">

</xml_diff>